<commit_message>
bunch of new shit and tag integrated model with age movement
</commit_message>
<xml_diff>
--- a/Docs/Spatial_Sablefish_Model_Building.pptx
+++ b/Docs/Spatial_Sablefish_Model_Building.pptx
@@ -5,14 +5,41 @@
     <p:sldMasterId id="2147483648" r:id="rId1"/>
   </p:sldMasterIdLst>
   <p:notesMasterIdLst>
-    <p:notesMasterId r:id="rId7"/>
+    <p:notesMasterId r:id="rId34"/>
   </p:notesMasterIdLst>
   <p:sldIdLst>
     <p:sldId id="256" r:id="rId2"/>
-    <p:sldId id="257" r:id="rId3"/>
-    <p:sldId id="260" r:id="rId4"/>
-    <p:sldId id="258" r:id="rId5"/>
-    <p:sldId id="259" r:id="rId6"/>
+    <p:sldId id="265" r:id="rId3"/>
+    <p:sldId id="258" r:id="rId4"/>
+    <p:sldId id="259" r:id="rId5"/>
+    <p:sldId id="260" r:id="rId6"/>
+    <p:sldId id="261" r:id="rId7"/>
+    <p:sldId id="262" r:id="rId8"/>
+    <p:sldId id="272" r:id="rId9"/>
+    <p:sldId id="263" r:id="rId10"/>
+    <p:sldId id="264" r:id="rId11"/>
+    <p:sldId id="273" r:id="rId12"/>
+    <p:sldId id="274" r:id="rId13"/>
+    <p:sldId id="275" r:id="rId14"/>
+    <p:sldId id="276" r:id="rId15"/>
+    <p:sldId id="277" r:id="rId16"/>
+    <p:sldId id="266" r:id="rId17"/>
+    <p:sldId id="267" r:id="rId18"/>
+    <p:sldId id="278" r:id="rId19"/>
+    <p:sldId id="279" r:id="rId20"/>
+    <p:sldId id="280" r:id="rId21"/>
+    <p:sldId id="281" r:id="rId22"/>
+    <p:sldId id="282" r:id="rId23"/>
+    <p:sldId id="268" r:id="rId24"/>
+    <p:sldId id="269" r:id="rId25"/>
+    <p:sldId id="283" r:id="rId26"/>
+    <p:sldId id="284" r:id="rId27"/>
+    <p:sldId id="285" r:id="rId28"/>
+    <p:sldId id="286" r:id="rId29"/>
+    <p:sldId id="287" r:id="rId30"/>
+    <p:sldId id="270" r:id="rId31"/>
+    <p:sldId id="288" r:id="rId32"/>
+    <p:sldId id="289" r:id="rId33"/>
   </p:sldIdLst>
   <p:sldSz cx="12192000" cy="6858000"/>
   <p:notesSz cx="6858000" cy="9144000"/>
@@ -201,7 +228,7 @@
           <a:p>
             <a:fld id="{00AAFEE8-3C9A-1D4E-A360-50A3F658751C}" type="datetimeFigureOut">
               <a:rPr lang="en-US" smtClean="0"/>
-              <a:t>9/6/24</a:t>
+              <a:t>9/11/24</a:t>
             </a:fld>
             <a:endParaRPr lang="en-US"/>
           </a:p>
@@ -699,7 +726,7 @@
           <a:p>
             <a:fld id="{0005108C-1A64-8843-829B-17355C18E746}" type="datetimeFigureOut">
               <a:rPr lang="en-US" smtClean="0"/>
-              <a:t>9/6/24</a:t>
+              <a:t>9/11/24</a:t>
             </a:fld>
             <a:endParaRPr lang="en-US"/>
           </a:p>
@@ -897,7 +924,7 @@
           <a:p>
             <a:fld id="{0005108C-1A64-8843-829B-17355C18E746}" type="datetimeFigureOut">
               <a:rPr lang="en-US" smtClean="0"/>
-              <a:t>9/6/24</a:t>
+              <a:t>9/11/24</a:t>
             </a:fld>
             <a:endParaRPr lang="en-US"/>
           </a:p>
@@ -1105,7 +1132,7 @@
           <a:p>
             <a:fld id="{0005108C-1A64-8843-829B-17355C18E746}" type="datetimeFigureOut">
               <a:rPr lang="en-US" smtClean="0"/>
-              <a:t>9/6/24</a:t>
+              <a:t>9/11/24</a:t>
             </a:fld>
             <a:endParaRPr lang="en-US"/>
           </a:p>
@@ -1303,7 +1330,7 @@
           <a:p>
             <a:fld id="{0005108C-1A64-8843-829B-17355C18E746}" type="datetimeFigureOut">
               <a:rPr lang="en-US" smtClean="0"/>
-              <a:t>9/6/24</a:t>
+              <a:t>9/11/24</a:t>
             </a:fld>
             <a:endParaRPr lang="en-US"/>
           </a:p>
@@ -1578,7 +1605,7 @@
           <a:p>
             <a:fld id="{0005108C-1A64-8843-829B-17355C18E746}" type="datetimeFigureOut">
               <a:rPr lang="en-US" smtClean="0"/>
-              <a:t>9/6/24</a:t>
+              <a:t>9/11/24</a:t>
             </a:fld>
             <a:endParaRPr lang="en-US"/>
           </a:p>
@@ -1843,7 +1870,7 @@
           <a:p>
             <a:fld id="{0005108C-1A64-8843-829B-17355C18E746}" type="datetimeFigureOut">
               <a:rPr lang="en-US" smtClean="0"/>
-              <a:t>9/6/24</a:t>
+              <a:t>9/11/24</a:t>
             </a:fld>
             <a:endParaRPr lang="en-US"/>
           </a:p>
@@ -2255,7 +2282,7 @@
           <a:p>
             <a:fld id="{0005108C-1A64-8843-829B-17355C18E746}" type="datetimeFigureOut">
               <a:rPr lang="en-US" smtClean="0"/>
-              <a:t>9/6/24</a:t>
+              <a:t>9/11/24</a:t>
             </a:fld>
             <a:endParaRPr lang="en-US"/>
           </a:p>
@@ -2396,7 +2423,7 @@
           <a:p>
             <a:fld id="{0005108C-1A64-8843-829B-17355C18E746}" type="datetimeFigureOut">
               <a:rPr lang="en-US" smtClean="0"/>
-              <a:t>9/6/24</a:t>
+              <a:t>9/11/24</a:t>
             </a:fld>
             <a:endParaRPr lang="en-US"/>
           </a:p>
@@ -2509,7 +2536,7 @@
           <a:p>
             <a:fld id="{0005108C-1A64-8843-829B-17355C18E746}" type="datetimeFigureOut">
               <a:rPr lang="en-US" smtClean="0"/>
-              <a:t>9/6/24</a:t>
+              <a:t>9/11/24</a:t>
             </a:fld>
             <a:endParaRPr lang="en-US"/>
           </a:p>
@@ -2820,7 +2847,7 @@
           <a:p>
             <a:fld id="{0005108C-1A64-8843-829B-17355C18E746}" type="datetimeFigureOut">
               <a:rPr lang="en-US" smtClean="0"/>
-              <a:t>9/6/24</a:t>
+              <a:t>9/11/24</a:t>
             </a:fld>
             <a:endParaRPr lang="en-US"/>
           </a:p>
@@ -3108,7 +3135,7 @@
           <a:p>
             <a:fld id="{0005108C-1A64-8843-829B-17355C18E746}" type="datetimeFigureOut">
               <a:rPr lang="en-US" smtClean="0"/>
-              <a:t>9/6/24</a:t>
+              <a:t>9/11/24</a:t>
             </a:fld>
             <a:endParaRPr lang="en-US"/>
           </a:p>
@@ -3349,7 +3376,7 @@
           <a:p>
             <a:fld id="{0005108C-1A64-8843-829B-17355C18E746}" type="datetimeFigureOut">
               <a:rPr lang="en-US" smtClean="0"/>
-              <a:t>9/6/24</a:t>
+              <a:t>9/11/24</a:t>
             </a:fld>
             <a:endParaRPr lang="en-US"/>
           </a:p>
@@ -3832,6 +3859,1156 @@
 </p:sld>
 </file>
 
+<file path=ppt/slides/slide10.xml><?xml version="1.0" encoding="utf-8"?>
+<p:sld xmlns:a="http://schemas.openxmlformats.org/drawingml/2006/main" xmlns:r="http://schemas.openxmlformats.org/officeDocument/2006/relationships" xmlns:p="http://schemas.openxmlformats.org/presentationml/2006/main">
+  <p:cSld>
+    <p:spTree>
+      <p:nvGrpSpPr>
+        <p:cNvPr id="1" name="">
+          <a:extLst>
+            <a:ext uri="{FF2B5EF4-FFF2-40B4-BE49-F238E27FC236}">
+              <a16:creationId xmlns:a16="http://schemas.microsoft.com/office/drawing/2014/main" id="{087B067E-019C-FF92-B014-67F0A56C7717}"/>
+            </a:ext>
+          </a:extLst>
+        </p:cNvPr>
+        <p:cNvGrpSpPr/>
+        <p:nvPr/>
+      </p:nvGrpSpPr>
+      <p:grpSpPr>
+        <a:xfrm>
+          <a:off x="0" y="0"/>
+          <a:ext cx="0" cy="0"/>
+          <a:chOff x="0" y="0"/>
+          <a:chExt cx="0" cy="0"/>
+        </a:xfrm>
+      </p:grpSpPr>
+      <p:sp>
+        <p:nvSpPr>
+          <p:cNvPr id="2" name="Title 1">
+            <a:extLst>
+              <a:ext uri="{FF2B5EF4-FFF2-40B4-BE49-F238E27FC236}">
+                <a16:creationId xmlns:a16="http://schemas.microsoft.com/office/drawing/2014/main" id="{4F52A824-D17A-4A8A-07E3-C2687DE39AC9}"/>
+              </a:ext>
+            </a:extLst>
+          </p:cNvPr>
+          <p:cNvSpPr>
+            <a:spLocks noGrp="1"/>
+          </p:cNvSpPr>
+          <p:nvPr>
+            <p:ph type="title"/>
+          </p:nvPr>
+        </p:nvSpPr>
+        <p:spPr/>
+        <p:txBody>
+          <a:bodyPr/>
+          <a:lstStyle/>
+          <a:p>
+            <a:r>
+              <a:rPr lang="en-US" dirty="0"/>
+              <a:t>Model Building (02 – Reporting Rate)</a:t>
+            </a:r>
+          </a:p>
+        </p:txBody>
+      </p:sp>
+      <p:sp>
+        <p:nvSpPr>
+          <p:cNvPr id="3" name="Content Placeholder 2">
+            <a:extLst>
+              <a:ext uri="{FF2B5EF4-FFF2-40B4-BE49-F238E27FC236}">
+                <a16:creationId xmlns:a16="http://schemas.microsoft.com/office/drawing/2014/main" id="{F56881B6-5E95-94AC-5ECC-72AD67851E93}"/>
+              </a:ext>
+            </a:extLst>
+          </p:cNvPr>
+          <p:cNvSpPr>
+            <a:spLocks noGrp="1"/>
+          </p:cNvSpPr>
+          <p:nvPr>
+            <p:ph idx="1"/>
+          </p:nvPr>
+        </p:nvSpPr>
+        <p:spPr/>
+        <p:txBody>
+          <a:bodyPr>
+            <a:normAutofit fontScale="92500" lnSpcReduction="10000"/>
+          </a:bodyPr>
+          <a:lstStyle/>
+          <a:p>
+            <a:r>
+              <a:rPr lang="en-US" dirty="0"/>
+              <a:t>Five Models</a:t>
+            </a:r>
+          </a:p>
+          <a:p>
+            <a:pPr lvl="1"/>
+            <a:r>
+              <a:rPr lang="en-US" dirty="0"/>
+              <a:t>01-NegBin </a:t>
+            </a:r>
+          </a:p>
+          <a:p>
+            <a:pPr lvl="2"/>
+            <a:r>
+              <a:rPr lang="en-US" dirty="0"/>
+              <a:t>Constant Reporting</a:t>
+            </a:r>
+          </a:p>
+          <a:p>
+            <a:pPr lvl="1"/>
+            <a:r>
+              <a:rPr lang="en-US" dirty="0"/>
+              <a:t>02-Recent</a:t>
+            </a:r>
+          </a:p>
+          <a:p>
+            <a:pPr lvl="2"/>
+            <a:r>
+              <a:rPr lang="en-US" dirty="0"/>
+              <a:t>Two blocks (1978 – 2016, 2017 – 2021) </a:t>
+            </a:r>
+          </a:p>
+          <a:p>
+            <a:pPr lvl="1"/>
+            <a:r>
+              <a:rPr lang="en-US" dirty="0"/>
+              <a:t>02-FishBlock</a:t>
+            </a:r>
+          </a:p>
+          <a:p>
+            <a:pPr lvl="2"/>
+            <a:r>
+              <a:rPr lang="en-US" dirty="0"/>
+              <a:t>Three blocks (1978 – 1994, 1995 – 2016, 2017 – 2021) </a:t>
+            </a:r>
+          </a:p>
+          <a:p>
+            <a:pPr lvl="1"/>
+            <a:r>
+              <a:rPr lang="en-US" dirty="0"/>
+              <a:t>02-Decadal</a:t>
+            </a:r>
+          </a:p>
+          <a:p>
+            <a:pPr lvl="2"/>
+            <a:r>
+              <a:rPr lang="en-US" dirty="0"/>
+              <a:t>Four blocks (1978 – 1989, 1990 – 2000, 2001 – 2010, 2011 – 2021)</a:t>
+            </a:r>
+          </a:p>
+          <a:p>
+            <a:pPr lvl="1"/>
+            <a:r>
+              <a:rPr lang="en-US" dirty="0"/>
+              <a:t>02-Spatial</a:t>
+            </a:r>
+          </a:p>
+          <a:p>
+            <a:pPr lvl="2"/>
+            <a:r>
+              <a:rPr lang="en-US" dirty="0"/>
+              <a:t>Tag reporting rates estimated for each region</a:t>
+            </a:r>
+          </a:p>
+          <a:p>
+            <a:r>
+              <a:rPr lang="en-US" dirty="0"/>
+              <a:t>I have no clue… what information is estimating this reporting rate…</a:t>
+            </a:r>
+          </a:p>
+          <a:p>
+            <a:pPr lvl="1"/>
+            <a:r>
+              <a:rPr lang="en-US" dirty="0"/>
+              <a:t>Is it using the catch in each region and comparing to number of recaptures?</a:t>
+            </a:r>
+          </a:p>
+          <a:p>
+            <a:endParaRPr lang="en-US" dirty="0"/>
+          </a:p>
+        </p:txBody>
+      </p:sp>
+    </p:spTree>
+    <p:extLst>
+      <p:ext uri="{BB962C8B-B14F-4D97-AF65-F5344CB8AC3E}">
+        <p14:creationId xmlns:p14="http://schemas.microsoft.com/office/powerpoint/2010/main" val="3583166539"/>
+      </p:ext>
+    </p:extLst>
+  </p:cSld>
+  <p:clrMapOvr>
+    <a:masterClrMapping/>
+  </p:clrMapOvr>
+</p:sld>
+</file>
+
+<file path=ppt/slides/slide11.xml><?xml version="1.0" encoding="utf-8"?>
+<p:sld xmlns:a="http://schemas.openxmlformats.org/drawingml/2006/main" xmlns:r="http://schemas.openxmlformats.org/officeDocument/2006/relationships" xmlns:p="http://schemas.openxmlformats.org/presentationml/2006/main">
+  <p:cSld>
+    <p:spTree>
+      <p:nvGrpSpPr>
+        <p:cNvPr id="1" name="">
+          <a:extLst>
+            <a:ext uri="{FF2B5EF4-FFF2-40B4-BE49-F238E27FC236}">
+              <a16:creationId xmlns:a16="http://schemas.microsoft.com/office/drawing/2014/main" id="{3BE10EB8-D8D0-147A-A33A-34C174C49DB4}"/>
+            </a:ext>
+          </a:extLst>
+        </p:cNvPr>
+        <p:cNvGrpSpPr/>
+        <p:nvPr/>
+      </p:nvGrpSpPr>
+      <p:grpSpPr>
+        <a:xfrm>
+          <a:off x="0" y="0"/>
+          <a:ext cx="0" cy="0"/>
+          <a:chOff x="0" y="0"/>
+          <a:chExt cx="0" cy="0"/>
+        </a:xfrm>
+      </p:grpSpPr>
+      <p:sp>
+        <p:nvSpPr>
+          <p:cNvPr id="2" name="Title 1">
+            <a:extLst>
+              <a:ext uri="{FF2B5EF4-FFF2-40B4-BE49-F238E27FC236}">
+                <a16:creationId xmlns:a16="http://schemas.microsoft.com/office/drawing/2014/main" id="{D705138F-E23A-9233-6CF0-F92FE38508F8}"/>
+              </a:ext>
+            </a:extLst>
+          </p:cNvPr>
+          <p:cNvSpPr>
+            <a:spLocks noGrp="1"/>
+          </p:cNvSpPr>
+          <p:nvPr>
+            <p:ph type="title"/>
+          </p:nvPr>
+        </p:nvSpPr>
+        <p:spPr/>
+        <p:txBody>
+          <a:bodyPr/>
+          <a:lstStyle/>
+          <a:p>
+            <a:r>
+              <a:rPr lang="en-US" dirty="0"/>
+              <a:t>Model Building (02 – Reporting Rate)</a:t>
+            </a:r>
+          </a:p>
+        </p:txBody>
+      </p:sp>
+      <p:pic>
+        <p:nvPicPr>
+          <p:cNvPr id="6" name="Picture 5">
+            <a:extLst>
+              <a:ext uri="{FF2B5EF4-FFF2-40B4-BE49-F238E27FC236}">
+                <a16:creationId xmlns:a16="http://schemas.microsoft.com/office/drawing/2014/main" id="{5CF8BA9E-E527-8898-A35A-B97D704C5A6B}"/>
+              </a:ext>
+            </a:extLst>
+          </p:cNvPr>
+          <p:cNvPicPr>
+            <a:picLocks noChangeAspect="1"/>
+          </p:cNvPicPr>
+          <p:nvPr/>
+        </p:nvPicPr>
+        <p:blipFill>
+          <a:blip r:embed="rId2"/>
+          <a:stretch>
+            <a:fillRect/>
+          </a:stretch>
+        </p:blipFill>
+        <p:spPr>
+          <a:xfrm>
+            <a:off x="838199" y="1494670"/>
+            <a:ext cx="10515599" cy="4907280"/>
+          </a:xfrm>
+          <a:prstGeom prst="rect">
+            <a:avLst/>
+          </a:prstGeom>
+        </p:spPr>
+      </p:pic>
+    </p:spTree>
+    <p:extLst>
+      <p:ext uri="{BB962C8B-B14F-4D97-AF65-F5344CB8AC3E}">
+        <p14:creationId xmlns:p14="http://schemas.microsoft.com/office/powerpoint/2010/main" val="1155812927"/>
+      </p:ext>
+    </p:extLst>
+  </p:cSld>
+  <p:clrMapOvr>
+    <a:masterClrMapping/>
+  </p:clrMapOvr>
+</p:sld>
+</file>
+
+<file path=ppt/slides/slide12.xml><?xml version="1.0" encoding="utf-8"?>
+<p:sld xmlns:a="http://schemas.openxmlformats.org/drawingml/2006/main" xmlns:r="http://schemas.openxmlformats.org/officeDocument/2006/relationships" xmlns:p="http://schemas.openxmlformats.org/presentationml/2006/main">
+  <p:cSld>
+    <p:spTree>
+      <p:nvGrpSpPr>
+        <p:cNvPr id="1" name="">
+          <a:extLst>
+            <a:ext uri="{FF2B5EF4-FFF2-40B4-BE49-F238E27FC236}">
+              <a16:creationId xmlns:a16="http://schemas.microsoft.com/office/drawing/2014/main" id="{9B3F7B2A-DC7A-89E5-E75F-1396561B108D}"/>
+            </a:ext>
+          </a:extLst>
+        </p:cNvPr>
+        <p:cNvGrpSpPr/>
+        <p:nvPr/>
+      </p:nvGrpSpPr>
+      <p:grpSpPr>
+        <a:xfrm>
+          <a:off x="0" y="0"/>
+          <a:ext cx="0" cy="0"/>
+          <a:chOff x="0" y="0"/>
+          <a:chExt cx="0" cy="0"/>
+        </a:xfrm>
+      </p:grpSpPr>
+      <p:sp>
+        <p:nvSpPr>
+          <p:cNvPr id="2" name="Title 1">
+            <a:extLst>
+              <a:ext uri="{FF2B5EF4-FFF2-40B4-BE49-F238E27FC236}">
+                <a16:creationId xmlns:a16="http://schemas.microsoft.com/office/drawing/2014/main" id="{02C4B77D-07F9-DA2F-F472-554053D50A76}"/>
+              </a:ext>
+            </a:extLst>
+          </p:cNvPr>
+          <p:cNvSpPr>
+            <a:spLocks noGrp="1"/>
+          </p:cNvSpPr>
+          <p:nvPr>
+            <p:ph type="title"/>
+          </p:nvPr>
+        </p:nvSpPr>
+        <p:spPr/>
+        <p:txBody>
+          <a:bodyPr/>
+          <a:lstStyle/>
+          <a:p>
+            <a:r>
+              <a:rPr lang="en-US" dirty="0"/>
+              <a:t>Model Building (02 – Reporting Rate)</a:t>
+            </a:r>
+          </a:p>
+        </p:txBody>
+      </p:sp>
+      <p:pic>
+        <p:nvPicPr>
+          <p:cNvPr id="4" name="Picture 3">
+            <a:extLst>
+              <a:ext uri="{FF2B5EF4-FFF2-40B4-BE49-F238E27FC236}">
+                <a16:creationId xmlns:a16="http://schemas.microsoft.com/office/drawing/2014/main" id="{586E9D73-A99E-CA08-9CEE-BE56590878DB}"/>
+              </a:ext>
+            </a:extLst>
+          </p:cNvPr>
+          <p:cNvPicPr>
+            <a:picLocks noChangeAspect="1"/>
+          </p:cNvPicPr>
+          <p:nvPr/>
+        </p:nvPicPr>
+        <p:blipFill>
+          <a:blip r:embed="rId2"/>
+          <a:stretch>
+            <a:fillRect/>
+          </a:stretch>
+        </p:blipFill>
+        <p:spPr>
+          <a:xfrm>
+            <a:off x="698739" y="1472720"/>
+            <a:ext cx="11378241" cy="5309846"/>
+          </a:xfrm>
+          <a:prstGeom prst="rect">
+            <a:avLst/>
+          </a:prstGeom>
+        </p:spPr>
+      </p:pic>
+    </p:spTree>
+    <p:extLst>
+      <p:ext uri="{BB962C8B-B14F-4D97-AF65-F5344CB8AC3E}">
+        <p14:creationId xmlns:p14="http://schemas.microsoft.com/office/powerpoint/2010/main" val="3466013393"/>
+      </p:ext>
+    </p:extLst>
+  </p:cSld>
+  <p:clrMapOvr>
+    <a:masterClrMapping/>
+  </p:clrMapOvr>
+</p:sld>
+</file>
+
+<file path=ppt/slides/slide13.xml><?xml version="1.0" encoding="utf-8"?>
+<p:sld xmlns:a="http://schemas.openxmlformats.org/drawingml/2006/main" xmlns:r="http://schemas.openxmlformats.org/officeDocument/2006/relationships" xmlns:p="http://schemas.openxmlformats.org/presentationml/2006/main">
+  <p:cSld>
+    <p:spTree>
+      <p:nvGrpSpPr>
+        <p:cNvPr id="1" name="">
+          <a:extLst>
+            <a:ext uri="{FF2B5EF4-FFF2-40B4-BE49-F238E27FC236}">
+              <a16:creationId xmlns:a16="http://schemas.microsoft.com/office/drawing/2014/main" id="{C430FA03-E8B4-EEAC-8B87-FE88D98ED9E5}"/>
+            </a:ext>
+          </a:extLst>
+        </p:cNvPr>
+        <p:cNvGrpSpPr/>
+        <p:nvPr/>
+      </p:nvGrpSpPr>
+      <p:grpSpPr>
+        <a:xfrm>
+          <a:off x="0" y="0"/>
+          <a:ext cx="0" cy="0"/>
+          <a:chOff x="0" y="0"/>
+          <a:chExt cx="0" cy="0"/>
+        </a:xfrm>
+      </p:grpSpPr>
+      <p:sp>
+        <p:nvSpPr>
+          <p:cNvPr id="2" name="Title 1">
+            <a:extLst>
+              <a:ext uri="{FF2B5EF4-FFF2-40B4-BE49-F238E27FC236}">
+                <a16:creationId xmlns:a16="http://schemas.microsoft.com/office/drawing/2014/main" id="{ACA617FE-58B3-5B8D-7F24-81AD56138379}"/>
+              </a:ext>
+            </a:extLst>
+          </p:cNvPr>
+          <p:cNvSpPr>
+            <a:spLocks noGrp="1"/>
+          </p:cNvSpPr>
+          <p:nvPr>
+            <p:ph type="title"/>
+          </p:nvPr>
+        </p:nvSpPr>
+        <p:spPr/>
+        <p:txBody>
+          <a:bodyPr/>
+          <a:lstStyle/>
+          <a:p>
+            <a:r>
+              <a:rPr lang="en-US" dirty="0"/>
+              <a:t>Model Building (02 – Reporting Rate)</a:t>
+            </a:r>
+          </a:p>
+        </p:txBody>
+      </p:sp>
+      <p:pic>
+        <p:nvPicPr>
+          <p:cNvPr id="4" name="Picture 3">
+            <a:extLst>
+              <a:ext uri="{FF2B5EF4-FFF2-40B4-BE49-F238E27FC236}">
+                <a16:creationId xmlns:a16="http://schemas.microsoft.com/office/drawing/2014/main" id="{0B66E8EB-DB14-98F1-8529-C60F2E714108}"/>
+              </a:ext>
+            </a:extLst>
+          </p:cNvPr>
+          <p:cNvPicPr>
+            <a:picLocks noChangeAspect="1"/>
+          </p:cNvPicPr>
+          <p:nvPr/>
+        </p:nvPicPr>
+        <p:blipFill>
+          <a:blip r:embed="rId2"/>
+          <a:stretch>
+            <a:fillRect/>
+          </a:stretch>
+        </p:blipFill>
+        <p:spPr>
+          <a:xfrm>
+            <a:off x="838200" y="1489972"/>
+            <a:ext cx="11126638" cy="5192431"/>
+          </a:xfrm>
+          <a:prstGeom prst="rect">
+            <a:avLst/>
+          </a:prstGeom>
+        </p:spPr>
+      </p:pic>
+    </p:spTree>
+    <p:extLst>
+      <p:ext uri="{BB962C8B-B14F-4D97-AF65-F5344CB8AC3E}">
+        <p14:creationId xmlns:p14="http://schemas.microsoft.com/office/powerpoint/2010/main" val="67494380"/>
+      </p:ext>
+    </p:extLst>
+  </p:cSld>
+  <p:clrMapOvr>
+    <a:masterClrMapping/>
+  </p:clrMapOvr>
+</p:sld>
+</file>
+
+<file path=ppt/slides/slide14.xml><?xml version="1.0" encoding="utf-8"?>
+<p:sld xmlns:a="http://schemas.openxmlformats.org/drawingml/2006/main" xmlns:r="http://schemas.openxmlformats.org/officeDocument/2006/relationships" xmlns:p="http://schemas.openxmlformats.org/presentationml/2006/main">
+  <p:cSld>
+    <p:spTree>
+      <p:nvGrpSpPr>
+        <p:cNvPr id="1" name="">
+          <a:extLst>
+            <a:ext uri="{FF2B5EF4-FFF2-40B4-BE49-F238E27FC236}">
+              <a16:creationId xmlns:a16="http://schemas.microsoft.com/office/drawing/2014/main" id="{C0CB053D-2DA5-092E-A7FA-E6D46E0170BF}"/>
+            </a:ext>
+          </a:extLst>
+        </p:cNvPr>
+        <p:cNvGrpSpPr/>
+        <p:nvPr/>
+      </p:nvGrpSpPr>
+      <p:grpSpPr>
+        <a:xfrm>
+          <a:off x="0" y="0"/>
+          <a:ext cx="0" cy="0"/>
+          <a:chOff x="0" y="0"/>
+          <a:chExt cx="0" cy="0"/>
+        </a:xfrm>
+      </p:grpSpPr>
+      <p:sp>
+        <p:nvSpPr>
+          <p:cNvPr id="2" name="Title 1">
+            <a:extLst>
+              <a:ext uri="{FF2B5EF4-FFF2-40B4-BE49-F238E27FC236}">
+                <a16:creationId xmlns:a16="http://schemas.microsoft.com/office/drawing/2014/main" id="{FA307CDA-BA68-2349-6775-DEF284CE7196}"/>
+              </a:ext>
+            </a:extLst>
+          </p:cNvPr>
+          <p:cNvSpPr>
+            <a:spLocks noGrp="1"/>
+          </p:cNvSpPr>
+          <p:nvPr>
+            <p:ph type="title"/>
+          </p:nvPr>
+        </p:nvSpPr>
+        <p:spPr/>
+        <p:txBody>
+          <a:bodyPr/>
+          <a:lstStyle/>
+          <a:p>
+            <a:r>
+              <a:rPr lang="en-US" dirty="0"/>
+              <a:t>Model Building (02 – Reporting Rate)</a:t>
+            </a:r>
+          </a:p>
+        </p:txBody>
+      </p:sp>
+      <p:pic>
+        <p:nvPicPr>
+          <p:cNvPr id="7" name="Picture 6">
+            <a:extLst>
+              <a:ext uri="{FF2B5EF4-FFF2-40B4-BE49-F238E27FC236}">
+                <a16:creationId xmlns:a16="http://schemas.microsoft.com/office/drawing/2014/main" id="{1A9BA604-D009-33FF-19B5-55D98DC65F39}"/>
+              </a:ext>
+            </a:extLst>
+          </p:cNvPr>
+          <p:cNvPicPr>
+            <a:picLocks noChangeAspect="1"/>
+          </p:cNvPicPr>
+          <p:nvPr/>
+        </p:nvPicPr>
+        <p:blipFill>
+          <a:blip r:embed="rId2"/>
+          <a:stretch>
+            <a:fillRect/>
+          </a:stretch>
+        </p:blipFill>
+        <p:spPr>
+          <a:xfrm>
+            <a:off x="208721" y="1339574"/>
+            <a:ext cx="11825199" cy="5518426"/>
+          </a:xfrm>
+          <a:prstGeom prst="rect">
+            <a:avLst/>
+          </a:prstGeom>
+        </p:spPr>
+      </p:pic>
+    </p:spTree>
+    <p:extLst>
+      <p:ext uri="{BB962C8B-B14F-4D97-AF65-F5344CB8AC3E}">
+        <p14:creationId xmlns:p14="http://schemas.microsoft.com/office/powerpoint/2010/main" val="2914104673"/>
+      </p:ext>
+    </p:extLst>
+  </p:cSld>
+  <p:clrMapOvr>
+    <a:masterClrMapping/>
+  </p:clrMapOvr>
+</p:sld>
+</file>
+
+<file path=ppt/slides/slide15.xml><?xml version="1.0" encoding="utf-8"?>
+<p:sld xmlns:a="http://schemas.openxmlformats.org/drawingml/2006/main" xmlns:r="http://schemas.openxmlformats.org/officeDocument/2006/relationships" xmlns:p="http://schemas.openxmlformats.org/presentationml/2006/main">
+  <p:cSld>
+    <p:spTree>
+      <p:nvGrpSpPr>
+        <p:cNvPr id="1" name="">
+          <a:extLst>
+            <a:ext uri="{FF2B5EF4-FFF2-40B4-BE49-F238E27FC236}">
+              <a16:creationId xmlns:a16="http://schemas.microsoft.com/office/drawing/2014/main" id="{9A4AF80D-8027-32F9-D3DA-768B73B13CA9}"/>
+            </a:ext>
+          </a:extLst>
+        </p:cNvPr>
+        <p:cNvGrpSpPr/>
+        <p:nvPr/>
+      </p:nvGrpSpPr>
+      <p:grpSpPr>
+        <a:xfrm>
+          <a:off x="0" y="0"/>
+          <a:ext cx="0" cy="0"/>
+          <a:chOff x="0" y="0"/>
+          <a:chExt cx="0" cy="0"/>
+        </a:xfrm>
+      </p:grpSpPr>
+      <p:sp>
+        <p:nvSpPr>
+          <p:cNvPr id="2" name="Title 1">
+            <a:extLst>
+              <a:ext uri="{FF2B5EF4-FFF2-40B4-BE49-F238E27FC236}">
+                <a16:creationId xmlns:a16="http://schemas.microsoft.com/office/drawing/2014/main" id="{0430C229-3BF9-4238-5BFE-2FE8DF1E570B}"/>
+              </a:ext>
+            </a:extLst>
+          </p:cNvPr>
+          <p:cNvSpPr>
+            <a:spLocks noGrp="1"/>
+          </p:cNvSpPr>
+          <p:nvPr>
+            <p:ph type="title"/>
+          </p:nvPr>
+        </p:nvSpPr>
+        <p:spPr/>
+        <p:txBody>
+          <a:bodyPr/>
+          <a:lstStyle/>
+          <a:p>
+            <a:r>
+              <a:rPr lang="en-US" dirty="0"/>
+              <a:t>Model Building (02 – Reporting Rate)</a:t>
+            </a:r>
+          </a:p>
+        </p:txBody>
+      </p:sp>
+      <p:pic>
+        <p:nvPicPr>
+          <p:cNvPr id="4" name="Picture 3">
+            <a:extLst>
+              <a:ext uri="{FF2B5EF4-FFF2-40B4-BE49-F238E27FC236}">
+                <a16:creationId xmlns:a16="http://schemas.microsoft.com/office/drawing/2014/main" id="{A474AC92-CEC8-AB25-B1E0-786ED9C0091C}"/>
+              </a:ext>
+            </a:extLst>
+          </p:cNvPr>
+          <p:cNvPicPr>
+            <a:picLocks noChangeAspect="1"/>
+          </p:cNvPicPr>
+          <p:nvPr/>
+        </p:nvPicPr>
+        <p:blipFill>
+          <a:blip r:embed="rId2"/>
+          <a:stretch>
+            <a:fillRect/>
+          </a:stretch>
+        </p:blipFill>
+        <p:spPr>
+          <a:xfrm>
+            <a:off x="480203" y="1412336"/>
+            <a:ext cx="11231593" cy="5241410"/>
+          </a:xfrm>
+          <a:prstGeom prst="rect">
+            <a:avLst/>
+          </a:prstGeom>
+        </p:spPr>
+      </p:pic>
+    </p:spTree>
+    <p:extLst>
+      <p:ext uri="{BB962C8B-B14F-4D97-AF65-F5344CB8AC3E}">
+        <p14:creationId xmlns:p14="http://schemas.microsoft.com/office/powerpoint/2010/main" val="911861483"/>
+      </p:ext>
+    </p:extLst>
+  </p:cSld>
+  <p:clrMapOvr>
+    <a:masterClrMapping/>
+  </p:clrMapOvr>
+</p:sld>
+</file>
+
+<file path=ppt/slides/slide16.xml><?xml version="1.0" encoding="utf-8"?>
+<p:sld xmlns:a="http://schemas.openxmlformats.org/drawingml/2006/main" xmlns:r="http://schemas.openxmlformats.org/officeDocument/2006/relationships" xmlns:p="http://schemas.openxmlformats.org/presentationml/2006/main">
+  <p:cSld>
+    <p:spTree>
+      <p:nvGrpSpPr>
+        <p:cNvPr id="1" name="">
+          <a:extLst>
+            <a:ext uri="{FF2B5EF4-FFF2-40B4-BE49-F238E27FC236}">
+              <a16:creationId xmlns:a16="http://schemas.microsoft.com/office/drawing/2014/main" id="{51A23C8C-4FDE-F3A1-7E79-27047361A6DC}"/>
+            </a:ext>
+          </a:extLst>
+        </p:cNvPr>
+        <p:cNvGrpSpPr/>
+        <p:nvPr/>
+      </p:nvGrpSpPr>
+      <p:grpSpPr>
+        <a:xfrm>
+          <a:off x="0" y="0"/>
+          <a:ext cx="0" cy="0"/>
+          <a:chOff x="0" y="0"/>
+          <a:chExt cx="0" cy="0"/>
+        </a:xfrm>
+      </p:grpSpPr>
+      <p:sp>
+        <p:nvSpPr>
+          <p:cNvPr id="2" name="Title 1">
+            <a:extLst>
+              <a:ext uri="{FF2B5EF4-FFF2-40B4-BE49-F238E27FC236}">
+                <a16:creationId xmlns:a16="http://schemas.microsoft.com/office/drawing/2014/main" id="{B6F6FE0F-4040-CEEC-1F3B-82802EFF1E9E}"/>
+              </a:ext>
+            </a:extLst>
+          </p:cNvPr>
+          <p:cNvSpPr>
+            <a:spLocks noGrp="1"/>
+          </p:cNvSpPr>
+          <p:nvPr>
+            <p:ph type="title"/>
+          </p:nvPr>
+        </p:nvSpPr>
+        <p:spPr/>
+        <p:txBody>
+          <a:bodyPr/>
+          <a:lstStyle/>
+          <a:p>
+            <a:r>
+              <a:rPr lang="en-US" dirty="0"/>
+              <a:t>Model Building (02 – Reporting Rate)</a:t>
+            </a:r>
+          </a:p>
+        </p:txBody>
+      </p:sp>
+      <p:sp>
+        <p:nvSpPr>
+          <p:cNvPr id="3" name="Content Placeholder 2">
+            <a:extLst>
+              <a:ext uri="{FF2B5EF4-FFF2-40B4-BE49-F238E27FC236}">
+                <a16:creationId xmlns:a16="http://schemas.microsoft.com/office/drawing/2014/main" id="{273752C1-F66A-923C-E2FF-395FC1FF1B4A}"/>
+              </a:ext>
+            </a:extLst>
+          </p:cNvPr>
+          <p:cNvSpPr>
+            <a:spLocks noGrp="1"/>
+          </p:cNvSpPr>
+          <p:nvPr>
+            <p:ph idx="1"/>
+          </p:nvPr>
+        </p:nvSpPr>
+        <p:spPr/>
+        <p:txBody>
+          <a:bodyPr/>
+          <a:lstStyle/>
+          <a:p>
+            <a:r>
+              <a:rPr lang="en-US" dirty="0"/>
+              <a:t>Any time-varying reporting rates results in better fits to tag recaptures</a:t>
+            </a:r>
+          </a:p>
+          <a:p>
+            <a:r>
+              <a:rPr lang="en-US" dirty="0"/>
+              <a:t>Some work from </a:t>
+            </a:r>
+            <a:r>
+              <a:rPr lang="en-US" dirty="0" err="1"/>
+              <a:t>Heiftez</a:t>
+            </a:r>
+            <a:r>
+              <a:rPr lang="en-US" dirty="0"/>
+              <a:t> and Fujioka showing that they might vary spatially and through time</a:t>
+            </a:r>
+          </a:p>
+          <a:p>
+            <a:r>
+              <a:rPr lang="en-US" dirty="0"/>
+              <a:t>Looking at these, spatial reporting rates don’t seem to lead to overly large improvements relative to a constant rate</a:t>
+            </a:r>
+          </a:p>
+          <a:p>
+            <a:r>
+              <a:rPr lang="en-US" dirty="0"/>
+              <a:t>My inclination is to go forward with 02-FishBlock because changes in fishery practices will likely lead to changes in reporting rates</a:t>
+            </a:r>
+          </a:p>
+          <a:p>
+            <a:pPr lvl="1"/>
+            <a:r>
+              <a:rPr lang="en-US" dirty="0"/>
+              <a:t>Also compared to decadal model – better fits, but less parameters and more well justified </a:t>
+            </a:r>
+          </a:p>
+        </p:txBody>
+      </p:sp>
+    </p:spTree>
+    <p:extLst>
+      <p:ext uri="{BB962C8B-B14F-4D97-AF65-F5344CB8AC3E}">
+        <p14:creationId xmlns:p14="http://schemas.microsoft.com/office/powerpoint/2010/main" val="838253344"/>
+      </p:ext>
+    </p:extLst>
+  </p:cSld>
+  <p:clrMapOvr>
+    <a:masterClrMapping/>
+  </p:clrMapOvr>
+</p:sld>
+</file>
+
+<file path=ppt/slides/slide17.xml><?xml version="1.0" encoding="utf-8"?>
+<p:sld xmlns:a="http://schemas.openxmlformats.org/drawingml/2006/main" xmlns:r="http://schemas.openxmlformats.org/officeDocument/2006/relationships" xmlns:p="http://schemas.openxmlformats.org/presentationml/2006/main">
+  <p:cSld>
+    <p:spTree>
+      <p:nvGrpSpPr>
+        <p:cNvPr id="1" name="">
+          <a:extLst>
+            <a:ext uri="{FF2B5EF4-FFF2-40B4-BE49-F238E27FC236}">
+              <a16:creationId xmlns:a16="http://schemas.microsoft.com/office/drawing/2014/main" id="{80317905-A2C2-9597-2B9C-ED73C6E03600}"/>
+            </a:ext>
+          </a:extLst>
+        </p:cNvPr>
+        <p:cNvGrpSpPr/>
+        <p:nvPr/>
+      </p:nvGrpSpPr>
+      <p:grpSpPr>
+        <a:xfrm>
+          <a:off x="0" y="0"/>
+          <a:ext cx="0" cy="0"/>
+          <a:chOff x="0" y="0"/>
+          <a:chExt cx="0" cy="0"/>
+        </a:xfrm>
+      </p:grpSpPr>
+      <p:sp>
+        <p:nvSpPr>
+          <p:cNvPr id="2" name="Title 1">
+            <a:extLst>
+              <a:ext uri="{FF2B5EF4-FFF2-40B4-BE49-F238E27FC236}">
+                <a16:creationId xmlns:a16="http://schemas.microsoft.com/office/drawing/2014/main" id="{8E15DD54-CC10-141F-9AA1-064A1E3D1771}"/>
+              </a:ext>
+            </a:extLst>
+          </p:cNvPr>
+          <p:cNvSpPr>
+            <a:spLocks noGrp="1"/>
+          </p:cNvSpPr>
+          <p:nvPr>
+            <p:ph type="title"/>
+          </p:nvPr>
+        </p:nvSpPr>
+        <p:spPr/>
+        <p:txBody>
+          <a:bodyPr/>
+          <a:lstStyle/>
+          <a:p>
+            <a:r>
+              <a:rPr lang="en-US" dirty="0"/>
+              <a:t>Model Building (03 – Movement)</a:t>
+            </a:r>
+          </a:p>
+        </p:txBody>
+      </p:sp>
+      <p:sp>
+        <p:nvSpPr>
+          <p:cNvPr id="3" name="Content Placeholder 2">
+            <a:extLst>
+              <a:ext uri="{FF2B5EF4-FFF2-40B4-BE49-F238E27FC236}">
+                <a16:creationId xmlns:a16="http://schemas.microsoft.com/office/drawing/2014/main" id="{43D12DAA-67D7-5EA1-AB97-63E9F0BD622F}"/>
+              </a:ext>
+            </a:extLst>
+          </p:cNvPr>
+          <p:cNvSpPr>
+            <a:spLocks noGrp="1"/>
+          </p:cNvSpPr>
+          <p:nvPr>
+            <p:ph idx="1"/>
+          </p:nvPr>
+        </p:nvSpPr>
+        <p:spPr/>
+        <p:txBody>
+          <a:bodyPr>
+            <a:normAutofit fontScale="92500" lnSpcReduction="10000"/>
+          </a:bodyPr>
+          <a:lstStyle/>
+          <a:p>
+            <a:r>
+              <a:rPr lang="en-US" dirty="0"/>
+              <a:t>Four Models</a:t>
+            </a:r>
+          </a:p>
+          <a:p>
+            <a:pPr lvl="1"/>
+            <a:r>
+              <a:rPr lang="en-US" dirty="0"/>
+              <a:t>02-FishBlock</a:t>
+            </a:r>
+          </a:p>
+          <a:p>
+            <a:pPr lvl="2"/>
+            <a:r>
+              <a:rPr lang="en-US" dirty="0"/>
+              <a:t>Three blocks (1978 – 1994, 1995 – 2016, 2017 – 2021) </a:t>
+            </a:r>
+          </a:p>
+          <a:p>
+            <a:pPr lvl="1"/>
+            <a:r>
+              <a:rPr lang="en-US" dirty="0"/>
+              <a:t>03-Time_4_Move</a:t>
+            </a:r>
+          </a:p>
+          <a:p>
+            <a:pPr lvl="2"/>
+            <a:r>
+              <a:rPr lang="en-US" dirty="0"/>
+              <a:t>4 time blocks: 1960 – 1990, 1991 – 2000, 2001 – 2010, 2011 – 2021</a:t>
+            </a:r>
+          </a:p>
+          <a:p>
+            <a:pPr lvl="1"/>
+            <a:r>
+              <a:rPr lang="en-US" dirty="0"/>
+              <a:t>03-Time_3_Move</a:t>
+            </a:r>
+          </a:p>
+          <a:p>
+            <a:pPr lvl="2"/>
+            <a:r>
+              <a:rPr lang="en-US" dirty="0"/>
+              <a:t>3 time blocks: 1960 – 1995, 1996 – 2010, 2011 – 2021</a:t>
+            </a:r>
+          </a:p>
+          <a:p>
+            <a:pPr lvl="1"/>
+            <a:r>
+              <a:rPr lang="en-US" dirty="0"/>
+              <a:t>03-Time_2_Move</a:t>
+            </a:r>
+          </a:p>
+          <a:p>
+            <a:pPr lvl="2"/>
+            <a:r>
+              <a:rPr lang="en-US" dirty="0"/>
+              <a:t>2 time blocks: 1960 – 1990, 1991 – 2021</a:t>
+            </a:r>
+          </a:p>
+          <a:p>
+            <a:r>
+              <a:rPr lang="en-US" dirty="0"/>
+              <a:t>Tried Age X Time blocks...model blows up with scale estimated at an insane number</a:t>
+            </a:r>
+          </a:p>
+          <a:p>
+            <a:r>
+              <a:rPr lang="en-US" dirty="0"/>
+              <a:t>Tried Age blocks too, and model also blows up</a:t>
+            </a:r>
+          </a:p>
+        </p:txBody>
+      </p:sp>
+    </p:spTree>
+    <p:extLst>
+      <p:ext uri="{BB962C8B-B14F-4D97-AF65-F5344CB8AC3E}">
+        <p14:creationId xmlns:p14="http://schemas.microsoft.com/office/powerpoint/2010/main" val="1972113798"/>
+      </p:ext>
+    </p:extLst>
+  </p:cSld>
+  <p:clrMapOvr>
+    <a:masterClrMapping/>
+  </p:clrMapOvr>
+</p:sld>
+</file>
+
+<file path=ppt/slides/slide18.xml><?xml version="1.0" encoding="utf-8"?>
+<p:sld xmlns:a="http://schemas.openxmlformats.org/drawingml/2006/main" xmlns:r="http://schemas.openxmlformats.org/officeDocument/2006/relationships" xmlns:p="http://schemas.openxmlformats.org/presentationml/2006/main">
+  <p:cSld>
+    <p:spTree>
+      <p:nvGrpSpPr>
+        <p:cNvPr id="1" name="">
+          <a:extLst>
+            <a:ext uri="{FF2B5EF4-FFF2-40B4-BE49-F238E27FC236}">
+              <a16:creationId xmlns:a16="http://schemas.microsoft.com/office/drawing/2014/main" id="{5BB4B43E-DD51-E8F8-EC3D-0A7E79E07489}"/>
+            </a:ext>
+          </a:extLst>
+        </p:cNvPr>
+        <p:cNvGrpSpPr/>
+        <p:nvPr/>
+      </p:nvGrpSpPr>
+      <p:grpSpPr>
+        <a:xfrm>
+          <a:off x="0" y="0"/>
+          <a:ext cx="0" cy="0"/>
+          <a:chOff x="0" y="0"/>
+          <a:chExt cx="0" cy="0"/>
+        </a:xfrm>
+      </p:grpSpPr>
+      <p:sp>
+        <p:nvSpPr>
+          <p:cNvPr id="2" name="Title 1">
+            <a:extLst>
+              <a:ext uri="{FF2B5EF4-FFF2-40B4-BE49-F238E27FC236}">
+                <a16:creationId xmlns:a16="http://schemas.microsoft.com/office/drawing/2014/main" id="{28AD270C-93D5-56DA-CFA9-5D5E7FBD1910}"/>
+              </a:ext>
+            </a:extLst>
+          </p:cNvPr>
+          <p:cNvSpPr>
+            <a:spLocks noGrp="1"/>
+          </p:cNvSpPr>
+          <p:nvPr>
+            <p:ph type="title"/>
+          </p:nvPr>
+        </p:nvSpPr>
+        <p:spPr/>
+        <p:txBody>
+          <a:bodyPr/>
+          <a:lstStyle/>
+          <a:p>
+            <a:r>
+              <a:rPr lang="en-US" dirty="0"/>
+              <a:t>Model Building (03 – Movement)</a:t>
+            </a:r>
+          </a:p>
+        </p:txBody>
+      </p:sp>
+      <p:sp>
+        <p:nvSpPr>
+          <p:cNvPr id="5" name="Content Placeholder 4">
+            <a:extLst>
+              <a:ext uri="{FF2B5EF4-FFF2-40B4-BE49-F238E27FC236}">
+                <a16:creationId xmlns:a16="http://schemas.microsoft.com/office/drawing/2014/main" id="{6A7678B6-37AF-F48B-DE9E-491FD84F3C3D}"/>
+              </a:ext>
+            </a:extLst>
+          </p:cNvPr>
+          <p:cNvSpPr>
+            <a:spLocks noGrp="1"/>
+          </p:cNvSpPr>
+          <p:nvPr>
+            <p:ph idx="1"/>
+          </p:nvPr>
+        </p:nvSpPr>
+        <p:spPr/>
+        <p:txBody>
+          <a:bodyPr/>
+          <a:lstStyle/>
+          <a:p>
+            <a:endParaRPr lang="en-US"/>
+          </a:p>
+        </p:txBody>
+      </p:sp>
+      <p:pic>
+        <p:nvPicPr>
+          <p:cNvPr id="6" name="Picture 5">
+            <a:extLst>
+              <a:ext uri="{FF2B5EF4-FFF2-40B4-BE49-F238E27FC236}">
+                <a16:creationId xmlns:a16="http://schemas.microsoft.com/office/drawing/2014/main" id="{6DBC23B5-ACB2-8E1A-B0F9-B26889F6FD13}"/>
+              </a:ext>
+            </a:extLst>
+          </p:cNvPr>
+          <p:cNvPicPr>
+            <a:picLocks noChangeAspect="1"/>
+          </p:cNvPicPr>
+          <p:nvPr/>
+        </p:nvPicPr>
+        <p:blipFill>
+          <a:blip r:embed="rId2"/>
+          <a:stretch>
+            <a:fillRect/>
+          </a:stretch>
+        </p:blipFill>
+        <p:spPr>
+          <a:xfrm>
+            <a:off x="838200" y="1440863"/>
+            <a:ext cx="10973274" cy="5120861"/>
+          </a:xfrm>
+          <a:prstGeom prst="rect">
+            <a:avLst/>
+          </a:prstGeom>
+        </p:spPr>
+      </p:pic>
+    </p:spTree>
+    <p:extLst>
+      <p:ext uri="{BB962C8B-B14F-4D97-AF65-F5344CB8AC3E}">
+        <p14:creationId xmlns:p14="http://schemas.microsoft.com/office/powerpoint/2010/main" val="67183251"/>
+      </p:ext>
+    </p:extLst>
+  </p:cSld>
+  <p:clrMapOvr>
+    <a:masterClrMapping/>
+  </p:clrMapOvr>
+</p:sld>
+</file>
+
+<file path=ppt/slides/slide19.xml><?xml version="1.0" encoding="utf-8"?>
+<p:sld xmlns:a="http://schemas.openxmlformats.org/drawingml/2006/main" xmlns:r="http://schemas.openxmlformats.org/officeDocument/2006/relationships" xmlns:p="http://schemas.openxmlformats.org/presentationml/2006/main">
+  <p:cSld>
+    <p:spTree>
+      <p:nvGrpSpPr>
+        <p:cNvPr id="1" name="">
+          <a:extLst>
+            <a:ext uri="{FF2B5EF4-FFF2-40B4-BE49-F238E27FC236}">
+              <a16:creationId xmlns:a16="http://schemas.microsoft.com/office/drawing/2014/main" id="{C6A271AB-51F6-EFF3-1A5B-574D51FDD643}"/>
+            </a:ext>
+          </a:extLst>
+        </p:cNvPr>
+        <p:cNvGrpSpPr/>
+        <p:nvPr/>
+      </p:nvGrpSpPr>
+      <p:grpSpPr>
+        <a:xfrm>
+          <a:off x="0" y="0"/>
+          <a:ext cx="0" cy="0"/>
+          <a:chOff x="0" y="0"/>
+          <a:chExt cx="0" cy="0"/>
+        </a:xfrm>
+      </p:grpSpPr>
+      <p:sp>
+        <p:nvSpPr>
+          <p:cNvPr id="2" name="Title 1">
+            <a:extLst>
+              <a:ext uri="{FF2B5EF4-FFF2-40B4-BE49-F238E27FC236}">
+                <a16:creationId xmlns:a16="http://schemas.microsoft.com/office/drawing/2014/main" id="{56D838B9-7283-3730-A9FB-5D55E7D20ED1}"/>
+              </a:ext>
+            </a:extLst>
+          </p:cNvPr>
+          <p:cNvSpPr>
+            <a:spLocks noGrp="1"/>
+          </p:cNvSpPr>
+          <p:nvPr>
+            <p:ph type="title"/>
+          </p:nvPr>
+        </p:nvSpPr>
+        <p:spPr/>
+        <p:txBody>
+          <a:bodyPr/>
+          <a:lstStyle/>
+          <a:p>
+            <a:r>
+              <a:rPr lang="en-US" dirty="0"/>
+              <a:t>Model Building (03 – Movement)</a:t>
+            </a:r>
+          </a:p>
+        </p:txBody>
+      </p:sp>
+      <p:pic>
+        <p:nvPicPr>
+          <p:cNvPr id="4" name="Picture 3">
+            <a:extLst>
+              <a:ext uri="{FF2B5EF4-FFF2-40B4-BE49-F238E27FC236}">
+                <a16:creationId xmlns:a16="http://schemas.microsoft.com/office/drawing/2014/main" id="{EE91D004-7352-3FA7-C4F7-F9C5AA2267B4}"/>
+              </a:ext>
+            </a:extLst>
+          </p:cNvPr>
+          <p:cNvPicPr>
+            <a:picLocks noChangeAspect="1"/>
+          </p:cNvPicPr>
+          <p:nvPr/>
+        </p:nvPicPr>
+        <p:blipFill>
+          <a:blip r:embed="rId2"/>
+          <a:stretch>
+            <a:fillRect/>
+          </a:stretch>
+        </p:blipFill>
+        <p:spPr>
+          <a:xfrm>
+            <a:off x="385733" y="1528418"/>
+            <a:ext cx="11420533" cy="5329582"/>
+          </a:xfrm>
+          <a:prstGeom prst="rect">
+            <a:avLst/>
+          </a:prstGeom>
+        </p:spPr>
+      </p:pic>
+    </p:spTree>
+    <p:extLst>
+      <p:ext uri="{BB962C8B-B14F-4D97-AF65-F5344CB8AC3E}">
+        <p14:creationId xmlns:p14="http://schemas.microsoft.com/office/powerpoint/2010/main" val="2823164104"/>
+      </p:ext>
+    </p:extLst>
+  </p:cSld>
+  <p:clrMapOvr>
+    <a:masterClrMapping/>
+  </p:clrMapOvr>
+</p:sld>
+</file>
+
 <file path=ppt/slides/slide2.xml><?xml version="1.0" encoding="utf-8"?>
 <p:sld xmlns:a="http://schemas.openxmlformats.org/drawingml/2006/main" xmlns:r="http://schemas.openxmlformats.org/officeDocument/2006/relationships" xmlns:p="http://schemas.openxmlformats.org/presentationml/2006/main">
   <p:cSld>
@@ -3854,7 +5031,7 @@
           <p:cNvPr id="2" name="Title 1">
             <a:extLst>
               <a:ext uri="{FF2B5EF4-FFF2-40B4-BE49-F238E27FC236}">
-                <a16:creationId xmlns:a16="http://schemas.microsoft.com/office/drawing/2014/main" id="{952D0DB2-30C5-BA21-013D-A8884E874934}"/>
+                <a16:creationId xmlns:a16="http://schemas.microsoft.com/office/drawing/2014/main" id="{E3A18730-E86C-E7D4-8644-291ECF4537F5}"/>
               </a:ext>
             </a:extLst>
           </p:cNvPr>
@@ -3872,7 +5049,7 @@
           <a:p>
             <a:r>
               <a:rPr lang="en-US" dirty="0"/>
-              <a:t>Tag Likelihood</a:t>
+              <a:t>Base Parameterization</a:t>
             </a:r>
           </a:p>
         </p:txBody>
@@ -3882,7 +5059,7 @@
           <p:cNvPr id="3" name="Content Placeholder 2">
             <a:extLst>
               <a:ext uri="{FF2B5EF4-FFF2-40B4-BE49-F238E27FC236}">
-                <a16:creationId xmlns:a16="http://schemas.microsoft.com/office/drawing/2014/main" id="{C5C466BE-FFF1-56C3-FB0D-49431520AFB0}"/>
+                <a16:creationId xmlns:a16="http://schemas.microsoft.com/office/drawing/2014/main" id="{7A71D4CB-C8A1-A6F4-2E12-FEB18ADEF249}"/>
               </a:ext>
             </a:extLst>
           </p:cNvPr>
@@ -3895,32 +5072,1118 @@
         </p:nvSpPr>
         <p:spPr/>
         <p:txBody>
-          <a:bodyPr/>
-          <a:lstStyle/>
-          <a:p>
-            <a:r>
-              <a:rPr lang="en-US" dirty="0"/>
-              <a:t>Compare Poisson vs. Negative Binomial</a:t>
-            </a:r>
-          </a:p>
-          <a:p>
-            <a:r>
-              <a:rPr lang="en-US" dirty="0"/>
-              <a:t>Compare fits to indices</a:t>
-            </a:r>
-          </a:p>
-          <a:p>
-            <a:r>
-              <a:rPr lang="en-US" dirty="0"/>
-              <a:t>Two Models</a:t>
-            </a:r>
+          <a:bodyPr>
+            <a:normAutofit fontScale="92500"/>
+          </a:bodyPr>
+          <a:lstStyle/>
+          <a:p>
+            <a:r>
+              <a:rPr lang="en-US" dirty="0"/>
+              <a:t>5 Areas</a:t>
+            </a:r>
+          </a:p>
+          <a:p>
+            <a:r>
+              <a:rPr lang="en-US" dirty="0"/>
+              <a:t>Start at 1960</a:t>
+            </a:r>
+          </a:p>
+          <a:p>
+            <a:r>
+              <a:rPr lang="en-US" dirty="0"/>
+              <a:t>Multinomial for all composition data (weighted by bootstrapped ISS)</a:t>
+            </a:r>
+          </a:p>
+          <a:p>
+            <a:r>
+              <a:rPr lang="en-US" dirty="0"/>
+              <a:t>Using tag data from 1978 – 2020</a:t>
+            </a:r>
+          </a:p>
+          <a:p>
+            <a:r>
+              <a:rPr lang="en-US" dirty="0"/>
+              <a:t>Poisson tag likelihood</a:t>
+            </a:r>
+          </a:p>
+          <a:p>
+            <a:r>
+              <a:rPr lang="en-US" dirty="0"/>
+              <a:t>Constant tag reporting rate</a:t>
+            </a:r>
+          </a:p>
+          <a:p>
+            <a:r>
+              <a:rPr lang="en-US" dirty="0"/>
+              <a:t>Tag dynamics are release-conditioned</a:t>
+            </a:r>
+          </a:p>
+          <a:p>
+            <a:pPr marL="514350" indent="-514350">
+              <a:buAutoNum type="arabicParenR"/>
+            </a:pPr>
+            <a:r>
+              <a:rPr lang="en-US" dirty="0"/>
+              <a:t>Recruitment + Release, 2) Mortality + Ageing, 3) Movement (recruits don’t move), 4) Shedding </a:t>
+            </a:r>
+          </a:p>
+          <a:p>
+            <a:pPr marL="514350" indent="-514350">
+              <a:buAutoNum type="arabicParenR"/>
+            </a:pPr>
+            <a:endParaRPr lang="en-US" dirty="0"/>
+          </a:p>
+          <a:p>
+            <a:endParaRPr lang="en-US" dirty="0"/>
+          </a:p>
+          <a:p>
+            <a:endParaRPr lang="en-US" dirty="0"/>
+          </a:p>
+          <a:p>
+            <a:endParaRPr lang="en-US" dirty="0"/>
           </a:p>
         </p:txBody>
       </p:sp>
     </p:spTree>
     <p:extLst>
       <p:ext uri="{BB962C8B-B14F-4D97-AF65-F5344CB8AC3E}">
-        <p14:creationId xmlns:p14="http://schemas.microsoft.com/office/powerpoint/2010/main" val="971043061"/>
+        <p14:creationId xmlns:p14="http://schemas.microsoft.com/office/powerpoint/2010/main" val="278141876"/>
+      </p:ext>
+    </p:extLst>
+  </p:cSld>
+  <p:clrMapOvr>
+    <a:masterClrMapping/>
+  </p:clrMapOvr>
+</p:sld>
+</file>
+
+<file path=ppt/slides/slide20.xml><?xml version="1.0" encoding="utf-8"?>
+<p:sld xmlns:a="http://schemas.openxmlformats.org/drawingml/2006/main" xmlns:r="http://schemas.openxmlformats.org/officeDocument/2006/relationships" xmlns:p="http://schemas.openxmlformats.org/presentationml/2006/main">
+  <p:cSld>
+    <p:spTree>
+      <p:nvGrpSpPr>
+        <p:cNvPr id="1" name="">
+          <a:extLst>
+            <a:ext uri="{FF2B5EF4-FFF2-40B4-BE49-F238E27FC236}">
+              <a16:creationId xmlns:a16="http://schemas.microsoft.com/office/drawing/2014/main" id="{C85690A2-3E0D-50C2-E0A4-A60368CD7998}"/>
+            </a:ext>
+          </a:extLst>
+        </p:cNvPr>
+        <p:cNvGrpSpPr/>
+        <p:nvPr/>
+      </p:nvGrpSpPr>
+      <p:grpSpPr>
+        <a:xfrm>
+          <a:off x="0" y="0"/>
+          <a:ext cx="0" cy="0"/>
+          <a:chOff x="0" y="0"/>
+          <a:chExt cx="0" cy="0"/>
+        </a:xfrm>
+      </p:grpSpPr>
+      <p:sp>
+        <p:nvSpPr>
+          <p:cNvPr id="2" name="Title 1">
+            <a:extLst>
+              <a:ext uri="{FF2B5EF4-FFF2-40B4-BE49-F238E27FC236}">
+                <a16:creationId xmlns:a16="http://schemas.microsoft.com/office/drawing/2014/main" id="{F896A1CC-6DA5-4DC5-BFFC-6370EAC078FB}"/>
+              </a:ext>
+            </a:extLst>
+          </p:cNvPr>
+          <p:cNvSpPr>
+            <a:spLocks noGrp="1"/>
+          </p:cNvSpPr>
+          <p:nvPr>
+            <p:ph type="title"/>
+          </p:nvPr>
+        </p:nvSpPr>
+        <p:spPr/>
+        <p:txBody>
+          <a:bodyPr/>
+          <a:lstStyle/>
+          <a:p>
+            <a:r>
+              <a:rPr lang="en-US" dirty="0"/>
+              <a:t>Model Building (03 – Movement)</a:t>
+            </a:r>
+          </a:p>
+        </p:txBody>
+      </p:sp>
+      <p:pic>
+        <p:nvPicPr>
+          <p:cNvPr id="4" name="Picture 3">
+            <a:extLst>
+              <a:ext uri="{FF2B5EF4-FFF2-40B4-BE49-F238E27FC236}">
+                <a16:creationId xmlns:a16="http://schemas.microsoft.com/office/drawing/2014/main" id="{796EC833-7436-1BCB-145A-F7A7F840B3C7}"/>
+              </a:ext>
+            </a:extLst>
+          </p:cNvPr>
+          <p:cNvPicPr>
+            <a:picLocks noChangeAspect="1"/>
+          </p:cNvPicPr>
+          <p:nvPr/>
+        </p:nvPicPr>
+        <p:blipFill>
+          <a:blip r:embed="rId2"/>
+          <a:stretch>
+            <a:fillRect/>
+          </a:stretch>
+        </p:blipFill>
+        <p:spPr>
+          <a:xfrm>
+            <a:off x="838200" y="1615440"/>
+            <a:ext cx="11234057" cy="5242560"/>
+          </a:xfrm>
+          <a:prstGeom prst="rect">
+            <a:avLst/>
+          </a:prstGeom>
+        </p:spPr>
+      </p:pic>
+    </p:spTree>
+    <p:extLst>
+      <p:ext uri="{BB962C8B-B14F-4D97-AF65-F5344CB8AC3E}">
+        <p14:creationId xmlns:p14="http://schemas.microsoft.com/office/powerpoint/2010/main" val="3502083850"/>
+      </p:ext>
+    </p:extLst>
+  </p:cSld>
+  <p:clrMapOvr>
+    <a:masterClrMapping/>
+  </p:clrMapOvr>
+</p:sld>
+</file>
+
+<file path=ppt/slides/slide21.xml><?xml version="1.0" encoding="utf-8"?>
+<p:sld xmlns:a="http://schemas.openxmlformats.org/drawingml/2006/main" xmlns:r="http://schemas.openxmlformats.org/officeDocument/2006/relationships" xmlns:p="http://schemas.openxmlformats.org/presentationml/2006/main">
+  <p:cSld>
+    <p:spTree>
+      <p:nvGrpSpPr>
+        <p:cNvPr id="1" name="">
+          <a:extLst>
+            <a:ext uri="{FF2B5EF4-FFF2-40B4-BE49-F238E27FC236}">
+              <a16:creationId xmlns:a16="http://schemas.microsoft.com/office/drawing/2014/main" id="{A66413FB-75A6-6974-77F0-424744B111B0}"/>
+            </a:ext>
+          </a:extLst>
+        </p:cNvPr>
+        <p:cNvGrpSpPr/>
+        <p:nvPr/>
+      </p:nvGrpSpPr>
+      <p:grpSpPr>
+        <a:xfrm>
+          <a:off x="0" y="0"/>
+          <a:ext cx="0" cy="0"/>
+          <a:chOff x="0" y="0"/>
+          <a:chExt cx="0" cy="0"/>
+        </a:xfrm>
+      </p:grpSpPr>
+      <p:sp>
+        <p:nvSpPr>
+          <p:cNvPr id="2" name="Title 1">
+            <a:extLst>
+              <a:ext uri="{FF2B5EF4-FFF2-40B4-BE49-F238E27FC236}">
+                <a16:creationId xmlns:a16="http://schemas.microsoft.com/office/drawing/2014/main" id="{3EF1AB70-80BD-4B6C-A402-398D4FE06278}"/>
+              </a:ext>
+            </a:extLst>
+          </p:cNvPr>
+          <p:cNvSpPr>
+            <a:spLocks noGrp="1"/>
+          </p:cNvSpPr>
+          <p:nvPr>
+            <p:ph type="title"/>
+          </p:nvPr>
+        </p:nvSpPr>
+        <p:spPr/>
+        <p:txBody>
+          <a:bodyPr/>
+          <a:lstStyle/>
+          <a:p>
+            <a:r>
+              <a:rPr lang="en-US" dirty="0"/>
+              <a:t>Model Building (03 – Movement)</a:t>
+            </a:r>
+          </a:p>
+        </p:txBody>
+      </p:sp>
+      <p:pic>
+        <p:nvPicPr>
+          <p:cNvPr id="7" name="Picture 6">
+            <a:extLst>
+              <a:ext uri="{FF2B5EF4-FFF2-40B4-BE49-F238E27FC236}">
+                <a16:creationId xmlns:a16="http://schemas.microsoft.com/office/drawing/2014/main" id="{BE6A4CB9-CD34-C773-3431-412576642800}"/>
+              </a:ext>
+            </a:extLst>
+          </p:cNvPr>
+          <p:cNvPicPr>
+            <a:picLocks noChangeAspect="1"/>
+          </p:cNvPicPr>
+          <p:nvPr/>
+        </p:nvPicPr>
+        <p:blipFill>
+          <a:blip r:embed="rId2"/>
+          <a:stretch>
+            <a:fillRect/>
+          </a:stretch>
+        </p:blipFill>
+        <p:spPr>
+          <a:xfrm>
+            <a:off x="601082" y="1448905"/>
+            <a:ext cx="11590918" cy="5409095"/>
+          </a:xfrm>
+          <a:prstGeom prst="rect">
+            <a:avLst/>
+          </a:prstGeom>
+        </p:spPr>
+      </p:pic>
+    </p:spTree>
+    <p:extLst>
+      <p:ext uri="{BB962C8B-B14F-4D97-AF65-F5344CB8AC3E}">
+        <p14:creationId xmlns:p14="http://schemas.microsoft.com/office/powerpoint/2010/main" val="831421779"/>
+      </p:ext>
+    </p:extLst>
+  </p:cSld>
+  <p:clrMapOvr>
+    <a:masterClrMapping/>
+  </p:clrMapOvr>
+</p:sld>
+</file>
+
+<file path=ppt/slides/slide22.xml><?xml version="1.0" encoding="utf-8"?>
+<p:sld xmlns:a="http://schemas.openxmlformats.org/drawingml/2006/main" xmlns:r="http://schemas.openxmlformats.org/officeDocument/2006/relationships" xmlns:p="http://schemas.openxmlformats.org/presentationml/2006/main">
+  <p:cSld>
+    <p:spTree>
+      <p:nvGrpSpPr>
+        <p:cNvPr id="1" name="">
+          <a:extLst>
+            <a:ext uri="{FF2B5EF4-FFF2-40B4-BE49-F238E27FC236}">
+              <a16:creationId xmlns:a16="http://schemas.microsoft.com/office/drawing/2014/main" id="{DD349A8B-664A-86D3-ADB9-B4B646E6629B}"/>
+            </a:ext>
+          </a:extLst>
+        </p:cNvPr>
+        <p:cNvGrpSpPr/>
+        <p:nvPr/>
+      </p:nvGrpSpPr>
+      <p:grpSpPr>
+        <a:xfrm>
+          <a:off x="0" y="0"/>
+          <a:ext cx="0" cy="0"/>
+          <a:chOff x="0" y="0"/>
+          <a:chExt cx="0" cy="0"/>
+        </a:xfrm>
+      </p:grpSpPr>
+      <p:sp>
+        <p:nvSpPr>
+          <p:cNvPr id="2" name="Title 1">
+            <a:extLst>
+              <a:ext uri="{FF2B5EF4-FFF2-40B4-BE49-F238E27FC236}">
+                <a16:creationId xmlns:a16="http://schemas.microsoft.com/office/drawing/2014/main" id="{E3055E93-6BCB-7852-480E-1B70347E6116}"/>
+              </a:ext>
+            </a:extLst>
+          </p:cNvPr>
+          <p:cNvSpPr>
+            <a:spLocks noGrp="1"/>
+          </p:cNvSpPr>
+          <p:nvPr>
+            <p:ph type="title"/>
+          </p:nvPr>
+        </p:nvSpPr>
+        <p:spPr/>
+        <p:txBody>
+          <a:bodyPr/>
+          <a:lstStyle/>
+          <a:p>
+            <a:r>
+              <a:rPr lang="en-US" dirty="0"/>
+              <a:t>Model Building (03 – Movement)</a:t>
+            </a:r>
+          </a:p>
+        </p:txBody>
+      </p:sp>
+      <p:pic>
+        <p:nvPicPr>
+          <p:cNvPr id="7" name="Picture 6">
+            <a:extLst>
+              <a:ext uri="{FF2B5EF4-FFF2-40B4-BE49-F238E27FC236}">
+                <a16:creationId xmlns:a16="http://schemas.microsoft.com/office/drawing/2014/main" id="{2254F6F3-ADB0-99F7-8BD2-7C505BA91CA8}"/>
+              </a:ext>
+            </a:extLst>
+          </p:cNvPr>
+          <p:cNvPicPr>
+            <a:picLocks noChangeAspect="1"/>
+          </p:cNvPicPr>
+          <p:nvPr/>
+        </p:nvPicPr>
+        <p:blipFill>
+          <a:blip r:embed="rId2"/>
+          <a:stretch>
+            <a:fillRect/>
+          </a:stretch>
+        </p:blipFill>
+        <p:spPr>
+          <a:xfrm>
+            <a:off x="540025" y="1528417"/>
+            <a:ext cx="11420535" cy="5329583"/>
+          </a:xfrm>
+          <a:prstGeom prst="rect">
+            <a:avLst/>
+          </a:prstGeom>
+        </p:spPr>
+      </p:pic>
+    </p:spTree>
+    <p:extLst>
+      <p:ext uri="{BB962C8B-B14F-4D97-AF65-F5344CB8AC3E}">
+        <p14:creationId xmlns:p14="http://schemas.microsoft.com/office/powerpoint/2010/main" val="4268146306"/>
+      </p:ext>
+    </p:extLst>
+  </p:cSld>
+  <p:clrMapOvr>
+    <a:masterClrMapping/>
+  </p:clrMapOvr>
+</p:sld>
+</file>
+
+<file path=ppt/slides/slide23.xml><?xml version="1.0" encoding="utf-8"?>
+<p:sld xmlns:a="http://schemas.openxmlformats.org/drawingml/2006/main" xmlns:r="http://schemas.openxmlformats.org/officeDocument/2006/relationships" xmlns:p="http://schemas.openxmlformats.org/presentationml/2006/main">
+  <p:cSld>
+    <p:spTree>
+      <p:nvGrpSpPr>
+        <p:cNvPr id="1" name="">
+          <a:extLst>
+            <a:ext uri="{FF2B5EF4-FFF2-40B4-BE49-F238E27FC236}">
+              <a16:creationId xmlns:a16="http://schemas.microsoft.com/office/drawing/2014/main" id="{11C5CAE3-8037-A50C-AF25-9B413C36A0F7}"/>
+            </a:ext>
+          </a:extLst>
+        </p:cNvPr>
+        <p:cNvGrpSpPr/>
+        <p:nvPr/>
+      </p:nvGrpSpPr>
+      <p:grpSpPr>
+        <a:xfrm>
+          <a:off x="0" y="0"/>
+          <a:ext cx="0" cy="0"/>
+          <a:chOff x="0" y="0"/>
+          <a:chExt cx="0" cy="0"/>
+        </a:xfrm>
+      </p:grpSpPr>
+      <p:sp>
+        <p:nvSpPr>
+          <p:cNvPr id="2" name="Title 1">
+            <a:extLst>
+              <a:ext uri="{FF2B5EF4-FFF2-40B4-BE49-F238E27FC236}">
+                <a16:creationId xmlns:a16="http://schemas.microsoft.com/office/drawing/2014/main" id="{5185EE11-0823-A348-21D4-172D3EF21526}"/>
+              </a:ext>
+            </a:extLst>
+          </p:cNvPr>
+          <p:cNvSpPr>
+            <a:spLocks noGrp="1"/>
+          </p:cNvSpPr>
+          <p:nvPr>
+            <p:ph type="title"/>
+          </p:nvPr>
+        </p:nvSpPr>
+        <p:spPr/>
+        <p:txBody>
+          <a:bodyPr/>
+          <a:lstStyle/>
+          <a:p>
+            <a:r>
+              <a:rPr lang="en-US" dirty="0"/>
+              <a:t>Model Building (03 – Movement)</a:t>
+            </a:r>
+          </a:p>
+        </p:txBody>
+      </p:sp>
+      <p:sp>
+        <p:nvSpPr>
+          <p:cNvPr id="3" name="Content Placeholder 2">
+            <a:extLst>
+              <a:ext uri="{FF2B5EF4-FFF2-40B4-BE49-F238E27FC236}">
+                <a16:creationId xmlns:a16="http://schemas.microsoft.com/office/drawing/2014/main" id="{EA76D494-C6D2-7865-3352-538D5A04E029}"/>
+              </a:ext>
+            </a:extLst>
+          </p:cNvPr>
+          <p:cNvSpPr>
+            <a:spLocks noGrp="1"/>
+          </p:cNvSpPr>
+          <p:nvPr>
+            <p:ph idx="1"/>
+          </p:nvPr>
+        </p:nvSpPr>
+        <p:spPr/>
+        <p:txBody>
+          <a:bodyPr>
+            <a:normAutofit fontScale="85000" lnSpcReduction="10000"/>
+          </a:bodyPr>
+          <a:lstStyle/>
+          <a:p>
+            <a:r>
+              <a:rPr lang="en-US" dirty="0"/>
+              <a:t>4 time blocks converges, but very high uncertainty for movement estimates</a:t>
+            </a:r>
+          </a:p>
+          <a:p>
+            <a:r>
+              <a:rPr lang="en-US" dirty="0"/>
+              <a:t>3 time blocks fail to converge</a:t>
+            </a:r>
+          </a:p>
+          <a:p>
+            <a:r>
+              <a:rPr lang="en-US" dirty="0"/>
+              <a:t>2 time blocks converge, with movement relatively well estimated</a:t>
+            </a:r>
+          </a:p>
+          <a:p>
+            <a:r>
+              <a:rPr lang="en-US" dirty="0"/>
+              <a:t>Fits to recapture </a:t>
+            </a:r>
+            <a:r>
+              <a:rPr lang="en-US" dirty="0" err="1"/>
+              <a:t>dataa</a:t>
+            </a:r>
+            <a:r>
+              <a:rPr lang="en-US" dirty="0"/>
+              <a:t> re pretty similar, except for 3 time block models</a:t>
+            </a:r>
+          </a:p>
+          <a:p>
+            <a:r>
+              <a:rPr lang="en-US" dirty="0"/>
+              <a:t>Slightly improved fits with time-varying movement to index and recapture data</a:t>
+            </a:r>
+          </a:p>
+          <a:p>
+            <a:r>
+              <a:rPr lang="en-US" dirty="0"/>
+              <a:t>Movement estimates all seem to indicate WGOA is the transition zone, with high residency in CGOA and EGOA</a:t>
+            </a:r>
+          </a:p>
+          <a:p>
+            <a:r>
+              <a:rPr lang="en-US" dirty="0"/>
+              <a:t>Preference is to go with some time-varying movement, given uncertain estimates and convergence in 3 and 5 movement blocks, should go with 2 time blocks, since fits are similar among time-varying parameterizations</a:t>
+            </a:r>
+          </a:p>
+        </p:txBody>
+      </p:sp>
+    </p:spTree>
+    <p:extLst>
+      <p:ext uri="{BB962C8B-B14F-4D97-AF65-F5344CB8AC3E}">
+        <p14:creationId xmlns:p14="http://schemas.microsoft.com/office/powerpoint/2010/main" val="3453030137"/>
+      </p:ext>
+    </p:extLst>
+  </p:cSld>
+  <p:clrMapOvr>
+    <a:masterClrMapping/>
+  </p:clrMapOvr>
+</p:sld>
+</file>
+
+<file path=ppt/slides/slide24.xml><?xml version="1.0" encoding="utf-8"?>
+<p:sld xmlns:a="http://schemas.openxmlformats.org/drawingml/2006/main" xmlns:r="http://schemas.openxmlformats.org/officeDocument/2006/relationships" xmlns:p="http://schemas.openxmlformats.org/presentationml/2006/main">
+  <p:cSld>
+    <p:spTree>
+      <p:nvGrpSpPr>
+        <p:cNvPr id="1" name="">
+          <a:extLst>
+            <a:ext uri="{FF2B5EF4-FFF2-40B4-BE49-F238E27FC236}">
+              <a16:creationId xmlns:a16="http://schemas.microsoft.com/office/drawing/2014/main" id="{BC2AEFB2-E8B4-EA88-A681-80A31099C975}"/>
+            </a:ext>
+          </a:extLst>
+        </p:cNvPr>
+        <p:cNvGrpSpPr/>
+        <p:nvPr/>
+      </p:nvGrpSpPr>
+      <p:grpSpPr>
+        <a:xfrm>
+          <a:off x="0" y="0"/>
+          <a:ext cx="0" cy="0"/>
+          <a:chOff x="0" y="0"/>
+          <a:chExt cx="0" cy="0"/>
+        </a:xfrm>
+      </p:grpSpPr>
+      <p:sp>
+        <p:nvSpPr>
+          <p:cNvPr id="2" name="Title 1">
+            <a:extLst>
+              <a:ext uri="{FF2B5EF4-FFF2-40B4-BE49-F238E27FC236}">
+                <a16:creationId xmlns:a16="http://schemas.microsoft.com/office/drawing/2014/main" id="{6A00C365-06AB-47B5-2586-245BC25DCA72}"/>
+              </a:ext>
+            </a:extLst>
+          </p:cNvPr>
+          <p:cNvSpPr>
+            <a:spLocks noGrp="1"/>
+          </p:cNvSpPr>
+          <p:nvPr>
+            <p:ph type="title"/>
+          </p:nvPr>
+        </p:nvSpPr>
+        <p:spPr/>
+        <p:txBody>
+          <a:bodyPr/>
+          <a:lstStyle/>
+          <a:p>
+            <a:r>
+              <a:rPr lang="en-US" dirty="0"/>
+              <a:t>Model Building (04 – Spatial Q)</a:t>
+            </a:r>
+          </a:p>
+        </p:txBody>
+      </p:sp>
+      <p:sp>
+        <p:nvSpPr>
+          <p:cNvPr id="3" name="Content Placeholder 2">
+            <a:extLst>
+              <a:ext uri="{FF2B5EF4-FFF2-40B4-BE49-F238E27FC236}">
+                <a16:creationId xmlns:a16="http://schemas.microsoft.com/office/drawing/2014/main" id="{81E3545B-4582-266D-B454-6D6BEBBD392A}"/>
+              </a:ext>
+            </a:extLst>
+          </p:cNvPr>
+          <p:cNvSpPr>
+            <a:spLocks noGrp="1"/>
+          </p:cNvSpPr>
+          <p:nvPr>
+            <p:ph idx="1"/>
+          </p:nvPr>
+        </p:nvSpPr>
+        <p:spPr/>
+        <p:txBody>
+          <a:bodyPr>
+            <a:normAutofit/>
+          </a:bodyPr>
+          <a:lstStyle/>
+          <a:p>
+            <a:r>
+              <a:rPr lang="en-US" dirty="0"/>
+              <a:t>Two Models</a:t>
+            </a:r>
+          </a:p>
+          <a:p>
+            <a:pPr lvl="1"/>
+            <a:r>
+              <a:rPr lang="en-US" dirty="0"/>
+              <a:t>03-Time_2_Move</a:t>
+            </a:r>
+          </a:p>
+          <a:p>
+            <a:pPr lvl="2"/>
+            <a:r>
+              <a:rPr lang="en-US" dirty="0"/>
+              <a:t>2 time blocks: 1960 – 1990, 1991 – 2021</a:t>
+            </a:r>
+          </a:p>
+          <a:p>
+            <a:pPr lvl="1"/>
+            <a:r>
+              <a:rPr lang="en-US" dirty="0"/>
+              <a:t>04-SptQ</a:t>
+            </a:r>
+          </a:p>
+          <a:p>
+            <a:pPr lvl="2"/>
+            <a:r>
+              <a:rPr lang="en-US" dirty="0"/>
+              <a:t>Spatially varying catchability for surveys</a:t>
+            </a:r>
+          </a:p>
+          <a:p>
+            <a:r>
+              <a:rPr lang="en-US" dirty="0"/>
+              <a:t>Reasoning?</a:t>
+            </a:r>
+          </a:p>
+          <a:p>
+            <a:pPr lvl="1"/>
+            <a:r>
+              <a:rPr lang="en-US" dirty="0"/>
+              <a:t>Maybe differences in habitat use and how they overlap with surveys (i.e., depth)</a:t>
+            </a:r>
+          </a:p>
+          <a:p>
+            <a:pPr lvl="2"/>
+            <a:r>
+              <a:rPr lang="en-US" dirty="0"/>
+              <a:t>Begs the question of the alternating survey design in a single area assessment… is there then actually time-varying Q that alternates every other year, assuming that it is time-invariant?</a:t>
+            </a:r>
+          </a:p>
+          <a:p>
+            <a:pPr lvl="1"/>
+            <a:endParaRPr lang="en-US" dirty="0"/>
+          </a:p>
+        </p:txBody>
+      </p:sp>
+    </p:spTree>
+    <p:extLst>
+      <p:ext uri="{BB962C8B-B14F-4D97-AF65-F5344CB8AC3E}">
+        <p14:creationId xmlns:p14="http://schemas.microsoft.com/office/powerpoint/2010/main" val="4055193006"/>
+      </p:ext>
+    </p:extLst>
+  </p:cSld>
+  <p:clrMapOvr>
+    <a:masterClrMapping/>
+  </p:clrMapOvr>
+</p:sld>
+</file>
+
+<file path=ppt/slides/slide25.xml><?xml version="1.0" encoding="utf-8"?>
+<p:sld xmlns:a="http://schemas.openxmlformats.org/drawingml/2006/main" xmlns:r="http://schemas.openxmlformats.org/officeDocument/2006/relationships" xmlns:p="http://schemas.openxmlformats.org/presentationml/2006/main">
+  <p:cSld>
+    <p:spTree>
+      <p:nvGrpSpPr>
+        <p:cNvPr id="1" name="">
+          <a:extLst>
+            <a:ext uri="{FF2B5EF4-FFF2-40B4-BE49-F238E27FC236}">
+              <a16:creationId xmlns:a16="http://schemas.microsoft.com/office/drawing/2014/main" id="{3BFD9291-4F10-B0CA-B3FB-5A90DAA13F44}"/>
+            </a:ext>
+          </a:extLst>
+        </p:cNvPr>
+        <p:cNvGrpSpPr/>
+        <p:nvPr/>
+      </p:nvGrpSpPr>
+      <p:grpSpPr>
+        <a:xfrm>
+          <a:off x="0" y="0"/>
+          <a:ext cx="0" cy="0"/>
+          <a:chOff x="0" y="0"/>
+          <a:chExt cx="0" cy="0"/>
+        </a:xfrm>
+      </p:grpSpPr>
+      <p:sp>
+        <p:nvSpPr>
+          <p:cNvPr id="2" name="Title 1">
+            <a:extLst>
+              <a:ext uri="{FF2B5EF4-FFF2-40B4-BE49-F238E27FC236}">
+                <a16:creationId xmlns:a16="http://schemas.microsoft.com/office/drawing/2014/main" id="{995CB522-615B-DF3C-7A9E-F07CFE9B3AC1}"/>
+              </a:ext>
+            </a:extLst>
+          </p:cNvPr>
+          <p:cNvSpPr>
+            <a:spLocks noGrp="1"/>
+          </p:cNvSpPr>
+          <p:nvPr>
+            <p:ph type="title"/>
+          </p:nvPr>
+        </p:nvSpPr>
+        <p:spPr/>
+        <p:txBody>
+          <a:bodyPr/>
+          <a:lstStyle/>
+          <a:p>
+            <a:r>
+              <a:rPr lang="en-US" dirty="0"/>
+              <a:t>Model Building (04 – Spatial Q)</a:t>
+            </a:r>
+          </a:p>
+        </p:txBody>
+      </p:sp>
+      <p:pic>
+        <p:nvPicPr>
+          <p:cNvPr id="7" name="Picture 6">
+            <a:extLst>
+              <a:ext uri="{FF2B5EF4-FFF2-40B4-BE49-F238E27FC236}">
+                <a16:creationId xmlns:a16="http://schemas.microsoft.com/office/drawing/2014/main" id="{E4A949AF-8742-B05C-1FC8-164F0DE0238D}"/>
+              </a:ext>
+            </a:extLst>
+          </p:cNvPr>
+          <p:cNvPicPr>
+            <a:picLocks noChangeAspect="1"/>
+          </p:cNvPicPr>
+          <p:nvPr/>
+        </p:nvPicPr>
+        <p:blipFill>
+          <a:blip r:embed="rId2"/>
+          <a:stretch>
+            <a:fillRect/>
+          </a:stretch>
+        </p:blipFill>
+        <p:spPr>
+          <a:xfrm>
+            <a:off x="838200" y="1575683"/>
+            <a:ext cx="10999779" cy="5133230"/>
+          </a:xfrm>
+          <a:prstGeom prst="rect">
+            <a:avLst/>
+          </a:prstGeom>
+        </p:spPr>
+      </p:pic>
+    </p:spTree>
+    <p:extLst>
+      <p:ext uri="{BB962C8B-B14F-4D97-AF65-F5344CB8AC3E}">
+        <p14:creationId xmlns:p14="http://schemas.microsoft.com/office/powerpoint/2010/main" val="1088579777"/>
+      </p:ext>
+    </p:extLst>
+  </p:cSld>
+  <p:clrMapOvr>
+    <a:masterClrMapping/>
+  </p:clrMapOvr>
+</p:sld>
+</file>
+
+<file path=ppt/slides/slide26.xml><?xml version="1.0" encoding="utf-8"?>
+<p:sld xmlns:a="http://schemas.openxmlformats.org/drawingml/2006/main" xmlns:r="http://schemas.openxmlformats.org/officeDocument/2006/relationships" xmlns:p="http://schemas.openxmlformats.org/presentationml/2006/main">
+  <p:cSld>
+    <p:spTree>
+      <p:nvGrpSpPr>
+        <p:cNvPr id="1" name="">
+          <a:extLst>
+            <a:ext uri="{FF2B5EF4-FFF2-40B4-BE49-F238E27FC236}">
+              <a16:creationId xmlns:a16="http://schemas.microsoft.com/office/drawing/2014/main" id="{A050A87B-BF74-A9C3-B241-87DE95A13515}"/>
+            </a:ext>
+          </a:extLst>
+        </p:cNvPr>
+        <p:cNvGrpSpPr/>
+        <p:nvPr/>
+      </p:nvGrpSpPr>
+      <p:grpSpPr>
+        <a:xfrm>
+          <a:off x="0" y="0"/>
+          <a:ext cx="0" cy="0"/>
+          <a:chOff x="0" y="0"/>
+          <a:chExt cx="0" cy="0"/>
+        </a:xfrm>
+      </p:grpSpPr>
+      <p:sp>
+        <p:nvSpPr>
+          <p:cNvPr id="2" name="Title 1">
+            <a:extLst>
+              <a:ext uri="{FF2B5EF4-FFF2-40B4-BE49-F238E27FC236}">
+                <a16:creationId xmlns:a16="http://schemas.microsoft.com/office/drawing/2014/main" id="{4C198561-D14C-536A-DD78-32744A499624}"/>
+              </a:ext>
+            </a:extLst>
+          </p:cNvPr>
+          <p:cNvSpPr>
+            <a:spLocks noGrp="1"/>
+          </p:cNvSpPr>
+          <p:nvPr>
+            <p:ph type="title"/>
+          </p:nvPr>
+        </p:nvSpPr>
+        <p:spPr/>
+        <p:txBody>
+          <a:bodyPr/>
+          <a:lstStyle/>
+          <a:p>
+            <a:r>
+              <a:rPr lang="en-US" dirty="0"/>
+              <a:t>Model Building (04 – Spatial Q)</a:t>
+            </a:r>
+          </a:p>
+        </p:txBody>
+      </p:sp>
+      <p:pic>
+        <p:nvPicPr>
+          <p:cNvPr id="4" name="Picture 3">
+            <a:extLst>
+              <a:ext uri="{FF2B5EF4-FFF2-40B4-BE49-F238E27FC236}">
+                <a16:creationId xmlns:a16="http://schemas.microsoft.com/office/drawing/2014/main" id="{A7233CFA-1A21-4BED-032B-75264E1C07FA}"/>
+              </a:ext>
+            </a:extLst>
+          </p:cNvPr>
+          <p:cNvPicPr>
+            <a:picLocks noChangeAspect="1"/>
+          </p:cNvPicPr>
+          <p:nvPr/>
+        </p:nvPicPr>
+        <p:blipFill>
+          <a:blip r:embed="rId2"/>
+          <a:stretch>
+            <a:fillRect/>
+          </a:stretch>
+        </p:blipFill>
+        <p:spPr>
+          <a:xfrm>
+            <a:off x="364434" y="1389268"/>
+            <a:ext cx="11463131" cy="5349461"/>
+          </a:xfrm>
+          <a:prstGeom prst="rect">
+            <a:avLst/>
+          </a:prstGeom>
+        </p:spPr>
+      </p:pic>
+    </p:spTree>
+    <p:extLst>
+      <p:ext uri="{BB962C8B-B14F-4D97-AF65-F5344CB8AC3E}">
+        <p14:creationId xmlns:p14="http://schemas.microsoft.com/office/powerpoint/2010/main" val="4030684680"/>
+      </p:ext>
+    </p:extLst>
+  </p:cSld>
+  <p:clrMapOvr>
+    <a:masterClrMapping/>
+  </p:clrMapOvr>
+</p:sld>
+</file>
+
+<file path=ppt/slides/slide27.xml><?xml version="1.0" encoding="utf-8"?>
+<p:sld xmlns:a="http://schemas.openxmlformats.org/drawingml/2006/main" xmlns:r="http://schemas.openxmlformats.org/officeDocument/2006/relationships" xmlns:p="http://schemas.openxmlformats.org/presentationml/2006/main">
+  <p:cSld>
+    <p:spTree>
+      <p:nvGrpSpPr>
+        <p:cNvPr id="1" name="">
+          <a:extLst>
+            <a:ext uri="{FF2B5EF4-FFF2-40B4-BE49-F238E27FC236}">
+              <a16:creationId xmlns:a16="http://schemas.microsoft.com/office/drawing/2014/main" id="{30B157D2-FFBD-5234-0CD7-CA06355AF77B}"/>
+            </a:ext>
+          </a:extLst>
+        </p:cNvPr>
+        <p:cNvGrpSpPr/>
+        <p:nvPr/>
+      </p:nvGrpSpPr>
+      <p:grpSpPr>
+        <a:xfrm>
+          <a:off x="0" y="0"/>
+          <a:ext cx="0" cy="0"/>
+          <a:chOff x="0" y="0"/>
+          <a:chExt cx="0" cy="0"/>
+        </a:xfrm>
+      </p:grpSpPr>
+      <p:sp>
+        <p:nvSpPr>
+          <p:cNvPr id="2" name="Title 1">
+            <a:extLst>
+              <a:ext uri="{FF2B5EF4-FFF2-40B4-BE49-F238E27FC236}">
+                <a16:creationId xmlns:a16="http://schemas.microsoft.com/office/drawing/2014/main" id="{E3E36938-26D0-7D0B-3CEE-EC7478904EDA}"/>
+              </a:ext>
+            </a:extLst>
+          </p:cNvPr>
+          <p:cNvSpPr>
+            <a:spLocks noGrp="1"/>
+          </p:cNvSpPr>
+          <p:nvPr>
+            <p:ph type="title"/>
+          </p:nvPr>
+        </p:nvSpPr>
+        <p:spPr/>
+        <p:txBody>
+          <a:bodyPr/>
+          <a:lstStyle/>
+          <a:p>
+            <a:r>
+              <a:rPr lang="en-US" dirty="0"/>
+              <a:t>Model Building (04 – Spatial Q)</a:t>
+            </a:r>
+          </a:p>
+        </p:txBody>
+      </p:sp>
+      <p:pic>
+        <p:nvPicPr>
+          <p:cNvPr id="4" name="Picture 3">
+            <a:extLst>
+              <a:ext uri="{FF2B5EF4-FFF2-40B4-BE49-F238E27FC236}">
+                <a16:creationId xmlns:a16="http://schemas.microsoft.com/office/drawing/2014/main" id="{4AEE5461-F2FB-0E23-CE00-E4A44327B8EE}"/>
+              </a:ext>
+            </a:extLst>
+          </p:cNvPr>
+          <p:cNvPicPr>
+            <a:picLocks noChangeAspect="1"/>
+          </p:cNvPicPr>
+          <p:nvPr/>
+        </p:nvPicPr>
+        <p:blipFill>
+          <a:blip r:embed="rId2"/>
+          <a:stretch>
+            <a:fillRect/>
+          </a:stretch>
+        </p:blipFill>
+        <p:spPr>
+          <a:xfrm>
+            <a:off x="364434" y="1379330"/>
+            <a:ext cx="11463131" cy="5349461"/>
+          </a:xfrm>
+          <a:prstGeom prst="rect">
+            <a:avLst/>
+          </a:prstGeom>
+        </p:spPr>
+      </p:pic>
+    </p:spTree>
+    <p:extLst>
+      <p:ext uri="{BB962C8B-B14F-4D97-AF65-F5344CB8AC3E}">
+        <p14:creationId xmlns:p14="http://schemas.microsoft.com/office/powerpoint/2010/main" val="1388161426"/>
+      </p:ext>
+    </p:extLst>
+  </p:cSld>
+  <p:clrMapOvr>
+    <a:masterClrMapping/>
+  </p:clrMapOvr>
+</p:sld>
+</file>
+
+<file path=ppt/slides/slide28.xml><?xml version="1.0" encoding="utf-8"?>
+<p:sld xmlns:a="http://schemas.openxmlformats.org/drawingml/2006/main" xmlns:r="http://schemas.openxmlformats.org/officeDocument/2006/relationships" xmlns:p="http://schemas.openxmlformats.org/presentationml/2006/main">
+  <p:cSld>
+    <p:spTree>
+      <p:nvGrpSpPr>
+        <p:cNvPr id="1" name="">
+          <a:extLst>
+            <a:ext uri="{FF2B5EF4-FFF2-40B4-BE49-F238E27FC236}">
+              <a16:creationId xmlns:a16="http://schemas.microsoft.com/office/drawing/2014/main" id="{96D70BBA-DFC1-530F-8D96-29130087B290}"/>
+            </a:ext>
+          </a:extLst>
+        </p:cNvPr>
+        <p:cNvGrpSpPr/>
+        <p:nvPr/>
+      </p:nvGrpSpPr>
+      <p:grpSpPr>
+        <a:xfrm>
+          <a:off x="0" y="0"/>
+          <a:ext cx="0" cy="0"/>
+          <a:chOff x="0" y="0"/>
+          <a:chExt cx="0" cy="0"/>
+        </a:xfrm>
+      </p:grpSpPr>
+      <p:sp>
+        <p:nvSpPr>
+          <p:cNvPr id="2" name="Title 1">
+            <a:extLst>
+              <a:ext uri="{FF2B5EF4-FFF2-40B4-BE49-F238E27FC236}">
+                <a16:creationId xmlns:a16="http://schemas.microsoft.com/office/drawing/2014/main" id="{243E289C-9232-0AB4-72B5-D7F3CFF11319}"/>
+              </a:ext>
+            </a:extLst>
+          </p:cNvPr>
+          <p:cNvSpPr>
+            <a:spLocks noGrp="1"/>
+          </p:cNvSpPr>
+          <p:nvPr>
+            <p:ph type="title"/>
+          </p:nvPr>
+        </p:nvSpPr>
+        <p:spPr/>
+        <p:txBody>
+          <a:bodyPr/>
+          <a:lstStyle/>
+          <a:p>
+            <a:r>
+              <a:rPr lang="en-US" dirty="0"/>
+              <a:t>Model Building (04 – Spatial Q)</a:t>
+            </a:r>
+          </a:p>
+        </p:txBody>
+      </p:sp>
+      <p:pic>
+        <p:nvPicPr>
+          <p:cNvPr id="7" name="Picture 6">
+            <a:extLst>
+              <a:ext uri="{FF2B5EF4-FFF2-40B4-BE49-F238E27FC236}">
+                <a16:creationId xmlns:a16="http://schemas.microsoft.com/office/drawing/2014/main" id="{BB64B6F7-8EB9-38C2-7766-409967C2CA77}"/>
+              </a:ext>
+            </a:extLst>
+          </p:cNvPr>
+          <p:cNvPicPr>
+            <a:picLocks noChangeAspect="1"/>
+          </p:cNvPicPr>
+          <p:nvPr/>
+        </p:nvPicPr>
+        <p:blipFill>
+          <a:blip r:embed="rId2"/>
+          <a:stretch>
+            <a:fillRect/>
+          </a:stretch>
+        </p:blipFill>
+        <p:spPr>
+          <a:xfrm>
+            <a:off x="251791" y="1403405"/>
+            <a:ext cx="11688417" cy="5454595"/>
+          </a:xfrm>
+          <a:prstGeom prst="rect">
+            <a:avLst/>
+          </a:prstGeom>
+        </p:spPr>
+      </p:pic>
+    </p:spTree>
+    <p:extLst>
+      <p:ext uri="{BB962C8B-B14F-4D97-AF65-F5344CB8AC3E}">
+        <p14:creationId xmlns:p14="http://schemas.microsoft.com/office/powerpoint/2010/main" val="3085763257"/>
+      </p:ext>
+    </p:extLst>
+  </p:cSld>
+  <p:clrMapOvr>
+    <a:masterClrMapping/>
+  </p:clrMapOvr>
+</p:sld>
+</file>
+
+<file path=ppt/slides/slide29.xml><?xml version="1.0" encoding="utf-8"?>
+<p:sld xmlns:a="http://schemas.openxmlformats.org/drawingml/2006/main" xmlns:r="http://schemas.openxmlformats.org/officeDocument/2006/relationships" xmlns:p="http://schemas.openxmlformats.org/presentationml/2006/main">
+  <p:cSld>
+    <p:spTree>
+      <p:nvGrpSpPr>
+        <p:cNvPr id="1" name="">
+          <a:extLst>
+            <a:ext uri="{FF2B5EF4-FFF2-40B4-BE49-F238E27FC236}">
+              <a16:creationId xmlns:a16="http://schemas.microsoft.com/office/drawing/2014/main" id="{BF9461F6-F512-2738-1455-40F38C122155}"/>
+            </a:ext>
+          </a:extLst>
+        </p:cNvPr>
+        <p:cNvGrpSpPr/>
+        <p:nvPr/>
+      </p:nvGrpSpPr>
+      <p:grpSpPr>
+        <a:xfrm>
+          <a:off x="0" y="0"/>
+          <a:ext cx="0" cy="0"/>
+          <a:chOff x="0" y="0"/>
+          <a:chExt cx="0" cy="0"/>
+        </a:xfrm>
+      </p:grpSpPr>
+      <p:sp>
+        <p:nvSpPr>
+          <p:cNvPr id="2" name="Title 1">
+            <a:extLst>
+              <a:ext uri="{FF2B5EF4-FFF2-40B4-BE49-F238E27FC236}">
+                <a16:creationId xmlns:a16="http://schemas.microsoft.com/office/drawing/2014/main" id="{B0FD956D-C8B8-5084-FD7E-E1BE80019CF4}"/>
+              </a:ext>
+            </a:extLst>
+          </p:cNvPr>
+          <p:cNvSpPr>
+            <a:spLocks noGrp="1"/>
+          </p:cNvSpPr>
+          <p:nvPr>
+            <p:ph type="title"/>
+          </p:nvPr>
+        </p:nvSpPr>
+        <p:spPr/>
+        <p:txBody>
+          <a:bodyPr/>
+          <a:lstStyle/>
+          <a:p>
+            <a:r>
+              <a:rPr lang="en-US" dirty="0"/>
+              <a:t>Model Building (04 – Spatial Q)</a:t>
+            </a:r>
+          </a:p>
+        </p:txBody>
+      </p:sp>
+      <p:pic>
+        <p:nvPicPr>
+          <p:cNvPr id="4" name="Picture 3">
+            <a:extLst>
+              <a:ext uri="{FF2B5EF4-FFF2-40B4-BE49-F238E27FC236}">
+                <a16:creationId xmlns:a16="http://schemas.microsoft.com/office/drawing/2014/main" id="{7A151A8A-C0F8-D47C-A4E4-732D539879FE}"/>
+              </a:ext>
+            </a:extLst>
+          </p:cNvPr>
+          <p:cNvPicPr>
+            <a:picLocks noChangeAspect="1"/>
+          </p:cNvPicPr>
+          <p:nvPr/>
+        </p:nvPicPr>
+        <p:blipFill>
+          <a:blip r:embed="rId2"/>
+          <a:stretch>
+            <a:fillRect/>
+          </a:stretch>
+        </p:blipFill>
+        <p:spPr>
+          <a:xfrm>
+            <a:off x="311190" y="1458844"/>
+            <a:ext cx="11569620" cy="5399156"/>
+          </a:xfrm>
+          <a:prstGeom prst="rect">
+            <a:avLst/>
+          </a:prstGeom>
+        </p:spPr>
+      </p:pic>
+    </p:spTree>
+    <p:extLst>
+      <p:ext uri="{BB962C8B-B14F-4D97-AF65-F5344CB8AC3E}">
+        <p14:creationId xmlns:p14="http://schemas.microsoft.com/office/powerpoint/2010/main" val="879737846"/>
       </p:ext>
     </p:extLst>
   </p:cSld>
@@ -3952,7 +6215,7 @@
           <p:cNvPr id="2" name="Title 1">
             <a:extLst>
               <a:ext uri="{FF2B5EF4-FFF2-40B4-BE49-F238E27FC236}">
-                <a16:creationId xmlns:a16="http://schemas.microsoft.com/office/drawing/2014/main" id="{8A05A00C-D49A-E6DE-3F6A-A213D9B20AC6}"/>
+                <a16:creationId xmlns:a16="http://schemas.microsoft.com/office/drawing/2014/main" id="{9E9CB2E8-7905-BDFF-76DE-8770FD8569C2}"/>
               </a:ext>
             </a:extLst>
           </p:cNvPr>
@@ -3970,7 +6233,7 @@
           <a:p>
             <a:r>
               <a:rPr lang="en-US" dirty="0"/>
-              <a:t>Reporting rates</a:t>
+              <a:t>Model Building (01 – Tag likelihoods)</a:t>
             </a:r>
           </a:p>
         </p:txBody>
@@ -3980,7 +6243,7 @@
           <p:cNvPr id="3" name="Content Placeholder 2">
             <a:extLst>
               <a:ext uri="{FF2B5EF4-FFF2-40B4-BE49-F238E27FC236}">
-                <a16:creationId xmlns:a16="http://schemas.microsoft.com/office/drawing/2014/main" id="{40B3C0DE-9EA8-F437-BA81-CF1BC3AEB0AC}"/>
+                <a16:creationId xmlns:a16="http://schemas.microsoft.com/office/drawing/2014/main" id="{694345E8-EF9B-D309-9AE7-06EF0D30BD2D}"/>
               </a:ext>
             </a:extLst>
           </p:cNvPr>
@@ -3993,20 +6256,80 @@
         </p:nvSpPr>
         <p:spPr/>
         <p:txBody>
-          <a:bodyPr/>
-          <a:lstStyle/>
-          <a:p>
-            <a:r>
-              <a:rPr lang="en-US" dirty="0"/>
-              <a:t>Compare time-varying vs. time-invariant</a:t>
-            </a:r>
+          <a:bodyPr>
+            <a:normAutofit/>
+          </a:bodyPr>
+          <a:lstStyle/>
+          <a:p>
+            <a:r>
+              <a:rPr lang="en-US" dirty="0"/>
+              <a:t>Three Models</a:t>
+            </a:r>
+          </a:p>
+          <a:p>
+            <a:pPr lvl="1"/>
+            <a:r>
+              <a:rPr lang="en-US" dirty="0"/>
+              <a:t>01-Poisson</a:t>
+            </a:r>
+          </a:p>
+          <a:p>
+            <a:pPr lvl="1"/>
+            <a:r>
+              <a:rPr lang="en-US" dirty="0"/>
+              <a:t>01-NegBin</a:t>
+            </a:r>
+          </a:p>
+          <a:p>
+            <a:pPr lvl="1"/>
+            <a:r>
+              <a:rPr lang="en-US" dirty="0"/>
+              <a:t>01-Multinomial</a:t>
+            </a:r>
+          </a:p>
+          <a:p>
+            <a:pPr lvl="2"/>
+            <a:r>
+              <a:rPr lang="en-US" dirty="0"/>
+              <a:t>Reporting rate fixed at 0.276 using values from </a:t>
+            </a:r>
+            <a:r>
+              <a:rPr lang="en-US" dirty="0" err="1"/>
+              <a:t>Heiftez</a:t>
+            </a:r>
+            <a:r>
+              <a:rPr lang="en-US" dirty="0"/>
+              <a:t> and Fujioka</a:t>
+            </a:r>
+          </a:p>
+          <a:p>
+            <a:r>
+              <a:rPr lang="en-US" dirty="0"/>
+              <a:t>Compare models based on fits to indices here</a:t>
+            </a:r>
+          </a:p>
+          <a:p>
+            <a:r>
+              <a:rPr lang="en-US" dirty="0"/>
+              <a:t>Eliminate models based on convergence (01-Multinomial)</a:t>
+            </a:r>
+          </a:p>
+          <a:p>
+            <a:pPr lvl="1"/>
+            <a:r>
+              <a:rPr lang="en-US" dirty="0"/>
+              <a:t>I think I will spend more time on the Multinomial here, as some of the fits look kind of promising… not sure why it’s not converging</a:t>
+            </a:r>
+          </a:p>
+          <a:p>
+            <a:endParaRPr lang="en-US" dirty="0"/>
           </a:p>
         </p:txBody>
       </p:sp>
     </p:spTree>
     <p:extLst>
       <p:ext uri="{BB962C8B-B14F-4D97-AF65-F5344CB8AC3E}">
-        <p14:creationId xmlns:p14="http://schemas.microsoft.com/office/powerpoint/2010/main" val="2643309316"/>
+        <p14:creationId xmlns:p14="http://schemas.microsoft.com/office/powerpoint/2010/main" val="166737902"/>
       </p:ext>
     </p:extLst>
   </p:cSld>
@@ -4016,7 +6339,119 @@
 </p:sld>
 </file>
 
-<file path=ppt/slides/slide4.xml><?xml version="1.0" encoding="utf-8"?>
+<file path=ppt/slides/slide30.xml><?xml version="1.0" encoding="utf-8"?>
+<p:sld xmlns:a="http://schemas.openxmlformats.org/drawingml/2006/main" xmlns:r="http://schemas.openxmlformats.org/officeDocument/2006/relationships" xmlns:p="http://schemas.openxmlformats.org/presentationml/2006/main">
+  <p:cSld>
+    <p:spTree>
+      <p:nvGrpSpPr>
+        <p:cNvPr id="1" name="">
+          <a:extLst>
+            <a:ext uri="{FF2B5EF4-FFF2-40B4-BE49-F238E27FC236}">
+              <a16:creationId xmlns:a16="http://schemas.microsoft.com/office/drawing/2014/main" id="{12FD5CA5-BDF9-32B8-DA03-209FA39813E1}"/>
+            </a:ext>
+          </a:extLst>
+        </p:cNvPr>
+        <p:cNvGrpSpPr/>
+        <p:nvPr/>
+      </p:nvGrpSpPr>
+      <p:grpSpPr>
+        <a:xfrm>
+          <a:off x="0" y="0"/>
+          <a:ext cx="0" cy="0"/>
+          <a:chOff x="0" y="0"/>
+          <a:chExt cx="0" cy="0"/>
+        </a:xfrm>
+      </p:grpSpPr>
+      <p:sp>
+        <p:nvSpPr>
+          <p:cNvPr id="2" name="Title 1">
+            <a:extLst>
+              <a:ext uri="{FF2B5EF4-FFF2-40B4-BE49-F238E27FC236}">
+                <a16:creationId xmlns:a16="http://schemas.microsoft.com/office/drawing/2014/main" id="{9AF05EB3-020E-DB1A-5594-7B4319DACEEF}"/>
+              </a:ext>
+            </a:extLst>
+          </p:cNvPr>
+          <p:cNvSpPr>
+            <a:spLocks noGrp="1"/>
+          </p:cNvSpPr>
+          <p:nvPr>
+            <p:ph type="title"/>
+          </p:nvPr>
+        </p:nvSpPr>
+        <p:spPr/>
+        <p:txBody>
+          <a:bodyPr/>
+          <a:lstStyle/>
+          <a:p>
+            <a:r>
+              <a:rPr lang="en-US" dirty="0"/>
+              <a:t>Model Building (04 – Spatial Q)</a:t>
+            </a:r>
+          </a:p>
+        </p:txBody>
+      </p:sp>
+      <p:sp>
+        <p:nvSpPr>
+          <p:cNvPr id="3" name="Content Placeholder 2">
+            <a:extLst>
+              <a:ext uri="{FF2B5EF4-FFF2-40B4-BE49-F238E27FC236}">
+                <a16:creationId xmlns:a16="http://schemas.microsoft.com/office/drawing/2014/main" id="{DB878BA9-28CB-EB6E-98B4-27C91089AAB8}"/>
+              </a:ext>
+            </a:extLst>
+          </p:cNvPr>
+          <p:cNvSpPr>
+            <a:spLocks noGrp="1"/>
+          </p:cNvSpPr>
+          <p:nvPr>
+            <p:ph idx="1"/>
+          </p:nvPr>
+        </p:nvSpPr>
+        <p:spPr/>
+        <p:txBody>
+          <a:bodyPr>
+            <a:normAutofit/>
+          </a:bodyPr>
+          <a:lstStyle/>
+          <a:p>
+            <a:r>
+              <a:rPr lang="en-US" dirty="0"/>
+              <a:t>Spatial Q definitely fits way better to index</a:t>
+            </a:r>
+          </a:p>
+          <a:p>
+            <a:r>
+              <a:rPr lang="en-US" dirty="0"/>
+              <a:t>Very different trends in biomass and movement estimates</a:t>
+            </a:r>
+          </a:p>
+          <a:p>
+            <a:r>
+              <a:rPr lang="en-US" dirty="0"/>
+              <a:t>Spatial constant Q = allow areas with higher survey CPUE to scale accordingly</a:t>
+            </a:r>
+          </a:p>
+          <a:p>
+            <a:r>
+              <a:rPr lang="en-US" dirty="0"/>
+              <a:t>Spatially varying Q = model can’t anchor to higher or lower CPUE to attribute population scale… but catch data combined with rate of decline in survey indices can help inform that?</a:t>
+            </a:r>
+          </a:p>
+        </p:txBody>
+      </p:sp>
+    </p:spTree>
+    <p:extLst>
+      <p:ext uri="{BB962C8B-B14F-4D97-AF65-F5344CB8AC3E}">
+        <p14:creationId xmlns:p14="http://schemas.microsoft.com/office/powerpoint/2010/main" val="3892572056"/>
+      </p:ext>
+    </p:extLst>
+  </p:cSld>
+  <p:clrMapOvr>
+    <a:masterClrMapping/>
+  </p:clrMapOvr>
+</p:sld>
+</file>
+
+<file path=ppt/slides/slide31.xml><?xml version="1.0" encoding="utf-8"?>
 <p:sld xmlns:a="http://schemas.openxmlformats.org/drawingml/2006/main" xmlns:r="http://schemas.openxmlformats.org/officeDocument/2006/relationships" xmlns:p="http://schemas.openxmlformats.org/presentationml/2006/main">
   <p:cSld>
     <p:spTree>
@@ -4033,12 +6468,42 @@
           <a:chExt cx="0" cy="0"/>
         </a:xfrm>
       </p:grpSpPr>
+      <p:pic>
+        <p:nvPicPr>
+          <p:cNvPr id="5" name="Picture 4">
+            <a:extLst>
+              <a:ext uri="{FF2B5EF4-FFF2-40B4-BE49-F238E27FC236}">
+                <a16:creationId xmlns:a16="http://schemas.microsoft.com/office/drawing/2014/main" id="{2775B915-C74D-34F4-6699-0DDF83A48164}"/>
+              </a:ext>
+            </a:extLst>
+          </p:cNvPr>
+          <p:cNvPicPr>
+            <a:picLocks noChangeAspect="1"/>
+          </p:cNvPicPr>
+          <p:nvPr/>
+        </p:nvPicPr>
+        <p:blipFill>
+          <a:blip r:embed="rId2"/>
+          <a:stretch>
+            <a:fillRect/>
+          </a:stretch>
+        </p:blipFill>
+        <p:spPr>
+          <a:xfrm>
+            <a:off x="1530626" y="886939"/>
+            <a:ext cx="8845826" cy="5824359"/>
+          </a:xfrm>
+          <a:prstGeom prst="rect">
+            <a:avLst/>
+          </a:prstGeom>
+        </p:spPr>
+      </p:pic>
       <p:sp>
         <p:nvSpPr>
           <p:cNvPr id="2" name="Title 1">
             <a:extLst>
               <a:ext uri="{FF2B5EF4-FFF2-40B4-BE49-F238E27FC236}">
-                <a16:creationId xmlns:a16="http://schemas.microsoft.com/office/drawing/2014/main" id="{E1F38A55-DEF6-1916-3EA8-5C84F2809CF0}"/>
+                <a16:creationId xmlns:a16="http://schemas.microsoft.com/office/drawing/2014/main" id="{321E7685-D042-2C5E-160D-2E833DB7BAFE}"/>
               </a:ext>
             </a:extLst>
           </p:cNvPr>
@@ -4056,46 +6521,235 @@
           <a:p>
             <a:r>
               <a:rPr lang="en-US" dirty="0"/>
-              <a:t>Movement parameterization</a:t>
-            </a:r>
-          </a:p>
-        </p:txBody>
-      </p:sp>
-      <p:sp>
-        <p:nvSpPr>
-          <p:cNvPr id="3" name="Content Placeholder 2">
-            <a:extLst>
-              <a:ext uri="{FF2B5EF4-FFF2-40B4-BE49-F238E27FC236}">
-                <a16:creationId xmlns:a16="http://schemas.microsoft.com/office/drawing/2014/main" id="{F340A468-98F6-20B8-DB02-A3DB5DE3D763}"/>
-              </a:ext>
-            </a:extLst>
-          </p:cNvPr>
-          <p:cNvSpPr>
-            <a:spLocks noGrp="1"/>
-          </p:cNvSpPr>
-          <p:nvPr>
-            <p:ph idx="1"/>
-          </p:nvPr>
-        </p:nvSpPr>
-        <p:spPr/>
-        <p:txBody>
-          <a:bodyPr/>
-          <a:lstStyle/>
-          <a:p>
-            <a:r>
-              <a:rPr lang="en-US" dirty="0"/>
-              <a:t>Compare age-varying, time-varying, age-and time-varying, and age-and time-invariant</a:t>
-            </a:r>
-          </a:p>
-          <a:p>
-            <a:endParaRPr lang="en-US" dirty="0"/>
+              <a:t>Comparison with 1-Area model</a:t>
+            </a:r>
+          </a:p>
+        </p:txBody>
+      </p:sp>
+      <p:sp>
+        <p:nvSpPr>
+          <p:cNvPr id="8" name="TextBox 7">
+            <a:extLst>
+              <a:ext uri="{FF2B5EF4-FFF2-40B4-BE49-F238E27FC236}">
+                <a16:creationId xmlns:a16="http://schemas.microsoft.com/office/drawing/2014/main" id="{FD074298-7D74-9A1C-28A4-CC8C8FF76CB1}"/>
+              </a:ext>
+            </a:extLst>
+          </p:cNvPr>
+          <p:cNvSpPr txBox="1"/>
+          <p:nvPr/>
+        </p:nvSpPr>
+        <p:spPr>
+          <a:xfrm>
+            <a:off x="9923489" y="8229600"/>
+            <a:ext cx="184731" cy="369332"/>
+          </a:xfrm>
+          <a:prstGeom prst="rect">
+            <a:avLst/>
+          </a:prstGeom>
+          <a:noFill/>
+        </p:spPr>
+        <p:txBody>
+          <a:bodyPr wrap="none" rtlCol="0">
+            <a:spAutoFit/>
+          </a:bodyPr>
+          <a:lstStyle/>
+          <a:p>
+            <a:endParaRPr lang="en-US"/>
           </a:p>
         </p:txBody>
       </p:sp>
     </p:spTree>
     <p:extLst>
       <p:ext uri="{BB962C8B-B14F-4D97-AF65-F5344CB8AC3E}">
-        <p14:creationId xmlns:p14="http://schemas.microsoft.com/office/powerpoint/2010/main" val="1272733040"/>
+        <p14:creationId xmlns:p14="http://schemas.microsoft.com/office/powerpoint/2010/main" val="456617255"/>
+      </p:ext>
+    </p:extLst>
+  </p:cSld>
+  <p:clrMapOvr>
+    <a:masterClrMapping/>
+  </p:clrMapOvr>
+</p:sld>
+</file>
+
+<file path=ppt/slides/slide32.xml><?xml version="1.0" encoding="utf-8"?>
+<p:sld xmlns:a="http://schemas.openxmlformats.org/drawingml/2006/main" xmlns:r="http://schemas.openxmlformats.org/officeDocument/2006/relationships" xmlns:p="http://schemas.openxmlformats.org/presentationml/2006/main">
+  <p:cSld>
+    <p:spTree>
+      <p:nvGrpSpPr>
+        <p:cNvPr id="1" name="">
+          <a:extLst>
+            <a:ext uri="{FF2B5EF4-FFF2-40B4-BE49-F238E27FC236}">
+              <a16:creationId xmlns:a16="http://schemas.microsoft.com/office/drawing/2014/main" id="{A9CD7BE7-5232-731B-69F7-1C679D6D8F62}"/>
+            </a:ext>
+          </a:extLst>
+        </p:cNvPr>
+        <p:cNvGrpSpPr/>
+        <p:nvPr/>
+      </p:nvGrpSpPr>
+      <p:grpSpPr>
+        <a:xfrm>
+          <a:off x="0" y="0"/>
+          <a:ext cx="0" cy="0"/>
+          <a:chOff x="0" y="0"/>
+          <a:chExt cx="0" cy="0"/>
+        </a:xfrm>
+      </p:grpSpPr>
+      <p:sp>
+        <p:nvSpPr>
+          <p:cNvPr id="2" name="Title 1">
+            <a:extLst>
+              <a:ext uri="{FF2B5EF4-FFF2-40B4-BE49-F238E27FC236}">
+                <a16:creationId xmlns:a16="http://schemas.microsoft.com/office/drawing/2014/main" id="{1A7A432D-658E-8D49-DF1E-40C5EB612F19}"/>
+              </a:ext>
+            </a:extLst>
+          </p:cNvPr>
+          <p:cNvSpPr>
+            <a:spLocks noGrp="1"/>
+          </p:cNvSpPr>
+          <p:nvPr>
+            <p:ph type="title"/>
+          </p:nvPr>
+        </p:nvSpPr>
+        <p:spPr/>
+        <p:txBody>
+          <a:bodyPr/>
+          <a:lstStyle/>
+          <a:p>
+            <a:r>
+              <a:rPr lang="en-US" dirty="0"/>
+              <a:t>Comparison with 1-Area model</a:t>
+            </a:r>
+          </a:p>
+        </p:txBody>
+      </p:sp>
+      <p:pic>
+        <p:nvPicPr>
+          <p:cNvPr id="3" name="Picture 2">
+            <a:extLst>
+              <a:ext uri="{FF2B5EF4-FFF2-40B4-BE49-F238E27FC236}">
+                <a16:creationId xmlns:a16="http://schemas.microsoft.com/office/drawing/2014/main" id="{FD29FB28-5156-ABFE-460D-8641CBDA02E7}"/>
+              </a:ext>
+            </a:extLst>
+          </p:cNvPr>
+          <p:cNvPicPr>
+            <a:picLocks noChangeAspect="1"/>
+          </p:cNvPicPr>
+          <p:nvPr/>
+        </p:nvPicPr>
+        <p:blipFill>
+          <a:blip r:embed="rId2"/>
+          <a:stretch>
+            <a:fillRect/>
+          </a:stretch>
+        </p:blipFill>
+        <p:spPr>
+          <a:xfrm>
+            <a:off x="838200" y="1252057"/>
+            <a:ext cx="10045148" cy="5524254"/>
+          </a:xfrm>
+          <a:prstGeom prst="rect">
+            <a:avLst/>
+          </a:prstGeom>
+        </p:spPr>
+      </p:pic>
+    </p:spTree>
+    <p:extLst>
+      <p:ext uri="{BB962C8B-B14F-4D97-AF65-F5344CB8AC3E}">
+        <p14:creationId xmlns:p14="http://schemas.microsoft.com/office/powerpoint/2010/main" val="320716545"/>
+      </p:ext>
+    </p:extLst>
+  </p:cSld>
+  <p:clrMapOvr>
+    <a:masterClrMapping/>
+  </p:clrMapOvr>
+</p:sld>
+</file>
+
+<file path=ppt/slides/slide4.xml><?xml version="1.0" encoding="utf-8"?>
+<p:sld xmlns:a="http://schemas.openxmlformats.org/drawingml/2006/main" xmlns:r="http://schemas.openxmlformats.org/officeDocument/2006/relationships" xmlns:p="http://schemas.openxmlformats.org/presentationml/2006/main">
+  <p:cSld>
+    <p:spTree>
+      <p:nvGrpSpPr>
+        <p:cNvPr id="1" name="">
+          <a:extLst>
+            <a:ext uri="{FF2B5EF4-FFF2-40B4-BE49-F238E27FC236}">
+              <a16:creationId xmlns:a16="http://schemas.microsoft.com/office/drawing/2014/main" id="{67935E8A-6628-BE72-1CBC-47CAEDEC1E1B}"/>
+            </a:ext>
+          </a:extLst>
+        </p:cNvPr>
+        <p:cNvGrpSpPr/>
+        <p:nvPr/>
+      </p:nvGrpSpPr>
+      <p:grpSpPr>
+        <a:xfrm>
+          <a:off x="0" y="0"/>
+          <a:ext cx="0" cy="0"/>
+          <a:chOff x="0" y="0"/>
+          <a:chExt cx="0" cy="0"/>
+        </a:xfrm>
+      </p:grpSpPr>
+      <p:sp>
+        <p:nvSpPr>
+          <p:cNvPr id="2" name="Title 1">
+            <a:extLst>
+              <a:ext uri="{FF2B5EF4-FFF2-40B4-BE49-F238E27FC236}">
+                <a16:creationId xmlns:a16="http://schemas.microsoft.com/office/drawing/2014/main" id="{BFD4840D-2653-564F-95E3-C0727C1E0408}"/>
+              </a:ext>
+            </a:extLst>
+          </p:cNvPr>
+          <p:cNvSpPr>
+            <a:spLocks noGrp="1"/>
+          </p:cNvSpPr>
+          <p:nvPr>
+            <p:ph type="title"/>
+          </p:nvPr>
+        </p:nvSpPr>
+        <p:spPr/>
+        <p:txBody>
+          <a:bodyPr/>
+          <a:lstStyle/>
+          <a:p>
+            <a:r>
+              <a:rPr lang="en-US" dirty="0"/>
+              <a:t>Model Building (01 – Tag likelihoods)</a:t>
+            </a:r>
+          </a:p>
+        </p:txBody>
+      </p:sp>
+      <p:pic>
+        <p:nvPicPr>
+          <p:cNvPr id="9" name="Picture 8">
+            <a:extLst>
+              <a:ext uri="{FF2B5EF4-FFF2-40B4-BE49-F238E27FC236}">
+                <a16:creationId xmlns:a16="http://schemas.microsoft.com/office/drawing/2014/main" id="{CCDC578F-CC63-0110-D5A4-13E3C265EBBD}"/>
+              </a:ext>
+            </a:extLst>
+          </p:cNvPr>
+          <p:cNvPicPr>
+            <a:picLocks noChangeAspect="1"/>
+          </p:cNvPicPr>
+          <p:nvPr/>
+        </p:nvPicPr>
+        <p:blipFill>
+          <a:blip r:embed="rId2"/>
+          <a:stretch>
+            <a:fillRect/>
+          </a:stretch>
+        </p:blipFill>
+        <p:spPr>
+          <a:xfrm>
+            <a:off x="838200" y="1491905"/>
+            <a:ext cx="10945024" cy="5107678"/>
+          </a:xfrm>
+          <a:prstGeom prst="rect">
+            <a:avLst/>
+          </a:prstGeom>
+        </p:spPr>
+      </p:pic>
+    </p:spTree>
+    <p:extLst>
+      <p:ext uri="{BB962C8B-B14F-4D97-AF65-F5344CB8AC3E}">
+        <p14:creationId xmlns:p14="http://schemas.microsoft.com/office/powerpoint/2010/main" val="4269002735"/>
       </p:ext>
     </p:extLst>
   </p:cSld>
@@ -4106,6 +6760,382 @@
 </file>
 
 <file path=ppt/slides/slide5.xml><?xml version="1.0" encoding="utf-8"?>
+<p:sld xmlns:a="http://schemas.openxmlformats.org/drawingml/2006/main" xmlns:r="http://schemas.openxmlformats.org/officeDocument/2006/relationships" xmlns:p="http://schemas.openxmlformats.org/presentationml/2006/main">
+  <p:cSld>
+    <p:spTree>
+      <p:nvGrpSpPr>
+        <p:cNvPr id="1" name="">
+          <a:extLst>
+            <a:ext uri="{FF2B5EF4-FFF2-40B4-BE49-F238E27FC236}">
+              <a16:creationId xmlns:a16="http://schemas.microsoft.com/office/drawing/2014/main" id="{16FF86C0-8D7C-AC8B-2682-379E1D906687}"/>
+            </a:ext>
+          </a:extLst>
+        </p:cNvPr>
+        <p:cNvGrpSpPr/>
+        <p:nvPr/>
+      </p:nvGrpSpPr>
+      <p:grpSpPr>
+        <a:xfrm>
+          <a:off x="0" y="0"/>
+          <a:ext cx="0" cy="0"/>
+          <a:chOff x="0" y="0"/>
+          <a:chExt cx="0" cy="0"/>
+        </a:xfrm>
+      </p:grpSpPr>
+      <p:sp>
+        <p:nvSpPr>
+          <p:cNvPr id="2" name="Title 1">
+            <a:extLst>
+              <a:ext uri="{FF2B5EF4-FFF2-40B4-BE49-F238E27FC236}">
+                <a16:creationId xmlns:a16="http://schemas.microsoft.com/office/drawing/2014/main" id="{26657071-D1F4-A168-8F92-4A7D72BC6557}"/>
+              </a:ext>
+            </a:extLst>
+          </p:cNvPr>
+          <p:cNvSpPr>
+            <a:spLocks noGrp="1"/>
+          </p:cNvSpPr>
+          <p:nvPr>
+            <p:ph type="title"/>
+          </p:nvPr>
+        </p:nvSpPr>
+        <p:spPr/>
+        <p:txBody>
+          <a:bodyPr/>
+          <a:lstStyle/>
+          <a:p>
+            <a:r>
+              <a:rPr lang="en-US" dirty="0"/>
+              <a:t>Model Building (01 – Tag likelihoods)</a:t>
+            </a:r>
+          </a:p>
+        </p:txBody>
+      </p:sp>
+      <p:pic>
+        <p:nvPicPr>
+          <p:cNvPr id="6" name="Picture 5">
+            <a:extLst>
+              <a:ext uri="{FF2B5EF4-FFF2-40B4-BE49-F238E27FC236}">
+                <a16:creationId xmlns:a16="http://schemas.microsoft.com/office/drawing/2014/main" id="{EB99933E-C110-81B1-D692-FCA284C76E92}"/>
+              </a:ext>
+            </a:extLst>
+          </p:cNvPr>
+          <p:cNvPicPr>
+            <a:picLocks noChangeAspect="1"/>
+          </p:cNvPicPr>
+          <p:nvPr/>
+        </p:nvPicPr>
+        <p:blipFill>
+          <a:blip r:embed="rId2"/>
+          <a:stretch>
+            <a:fillRect/>
+          </a:stretch>
+        </p:blipFill>
+        <p:spPr>
+          <a:xfrm>
+            <a:off x="838199" y="1458843"/>
+            <a:ext cx="10787211" cy="5034032"/>
+          </a:xfrm>
+          <a:prstGeom prst="rect">
+            <a:avLst/>
+          </a:prstGeom>
+        </p:spPr>
+      </p:pic>
+    </p:spTree>
+    <p:extLst>
+      <p:ext uri="{BB962C8B-B14F-4D97-AF65-F5344CB8AC3E}">
+        <p14:creationId xmlns:p14="http://schemas.microsoft.com/office/powerpoint/2010/main" val="3727219035"/>
+      </p:ext>
+    </p:extLst>
+  </p:cSld>
+  <p:clrMapOvr>
+    <a:masterClrMapping/>
+  </p:clrMapOvr>
+</p:sld>
+</file>
+
+<file path=ppt/slides/slide6.xml><?xml version="1.0" encoding="utf-8"?>
+<p:sld xmlns:a="http://schemas.openxmlformats.org/drawingml/2006/main" xmlns:r="http://schemas.openxmlformats.org/officeDocument/2006/relationships" xmlns:p="http://schemas.openxmlformats.org/presentationml/2006/main">
+  <p:cSld>
+    <p:spTree>
+      <p:nvGrpSpPr>
+        <p:cNvPr id="1" name="">
+          <a:extLst>
+            <a:ext uri="{FF2B5EF4-FFF2-40B4-BE49-F238E27FC236}">
+              <a16:creationId xmlns:a16="http://schemas.microsoft.com/office/drawing/2014/main" id="{FE99D731-9986-59AD-C488-60E099299842}"/>
+            </a:ext>
+          </a:extLst>
+        </p:cNvPr>
+        <p:cNvGrpSpPr/>
+        <p:nvPr/>
+      </p:nvGrpSpPr>
+      <p:grpSpPr>
+        <a:xfrm>
+          <a:off x="0" y="0"/>
+          <a:ext cx="0" cy="0"/>
+          <a:chOff x="0" y="0"/>
+          <a:chExt cx="0" cy="0"/>
+        </a:xfrm>
+      </p:grpSpPr>
+      <p:sp>
+        <p:nvSpPr>
+          <p:cNvPr id="2" name="Title 1">
+            <a:extLst>
+              <a:ext uri="{FF2B5EF4-FFF2-40B4-BE49-F238E27FC236}">
+                <a16:creationId xmlns:a16="http://schemas.microsoft.com/office/drawing/2014/main" id="{9B812AAA-B241-EDD7-9C1F-CCC40DE75FA8}"/>
+              </a:ext>
+            </a:extLst>
+          </p:cNvPr>
+          <p:cNvSpPr>
+            <a:spLocks noGrp="1"/>
+          </p:cNvSpPr>
+          <p:nvPr>
+            <p:ph type="title"/>
+          </p:nvPr>
+        </p:nvSpPr>
+        <p:spPr/>
+        <p:txBody>
+          <a:bodyPr/>
+          <a:lstStyle/>
+          <a:p>
+            <a:r>
+              <a:rPr lang="en-US" dirty="0"/>
+              <a:t>Model Building (01 – Tag likelihoods)</a:t>
+            </a:r>
+          </a:p>
+        </p:txBody>
+      </p:sp>
+      <p:pic>
+        <p:nvPicPr>
+          <p:cNvPr id="7" name="Picture 6">
+            <a:extLst>
+              <a:ext uri="{FF2B5EF4-FFF2-40B4-BE49-F238E27FC236}">
+                <a16:creationId xmlns:a16="http://schemas.microsoft.com/office/drawing/2014/main" id="{DA8ECFF3-D24D-C2FF-4F13-72543C10EA5A}"/>
+              </a:ext>
+            </a:extLst>
+          </p:cNvPr>
+          <p:cNvPicPr>
+            <a:picLocks noChangeAspect="1"/>
+          </p:cNvPicPr>
+          <p:nvPr/>
+        </p:nvPicPr>
+        <p:blipFill>
+          <a:blip r:embed="rId2"/>
+          <a:stretch>
+            <a:fillRect/>
+          </a:stretch>
+        </p:blipFill>
+        <p:spPr>
+          <a:xfrm>
+            <a:off x="838199" y="1615440"/>
+            <a:ext cx="10637709" cy="4964264"/>
+          </a:xfrm>
+          <a:prstGeom prst="rect">
+            <a:avLst/>
+          </a:prstGeom>
+        </p:spPr>
+      </p:pic>
+    </p:spTree>
+    <p:extLst>
+      <p:ext uri="{BB962C8B-B14F-4D97-AF65-F5344CB8AC3E}">
+        <p14:creationId xmlns:p14="http://schemas.microsoft.com/office/powerpoint/2010/main" val="2639909020"/>
+      </p:ext>
+    </p:extLst>
+  </p:cSld>
+  <p:clrMapOvr>
+    <a:masterClrMapping/>
+  </p:clrMapOvr>
+</p:sld>
+</file>
+
+<file path=ppt/slides/slide7.xml><?xml version="1.0" encoding="utf-8"?>
+<p:sld xmlns:a="http://schemas.openxmlformats.org/drawingml/2006/main" xmlns:r="http://schemas.openxmlformats.org/officeDocument/2006/relationships" xmlns:p="http://schemas.openxmlformats.org/presentationml/2006/main">
+  <p:cSld>
+    <p:spTree>
+      <p:nvGrpSpPr>
+        <p:cNvPr id="1" name="">
+          <a:extLst>
+            <a:ext uri="{FF2B5EF4-FFF2-40B4-BE49-F238E27FC236}">
+              <a16:creationId xmlns:a16="http://schemas.microsoft.com/office/drawing/2014/main" id="{F5FF5593-6069-0A97-9154-EB5EEFBCCE64}"/>
+            </a:ext>
+          </a:extLst>
+        </p:cNvPr>
+        <p:cNvGrpSpPr/>
+        <p:nvPr/>
+      </p:nvGrpSpPr>
+      <p:grpSpPr>
+        <a:xfrm>
+          <a:off x="0" y="0"/>
+          <a:ext cx="0" cy="0"/>
+          <a:chOff x="0" y="0"/>
+          <a:chExt cx="0" cy="0"/>
+        </a:xfrm>
+      </p:grpSpPr>
+      <p:sp>
+        <p:nvSpPr>
+          <p:cNvPr id="2" name="Title 1">
+            <a:extLst>
+              <a:ext uri="{FF2B5EF4-FFF2-40B4-BE49-F238E27FC236}">
+                <a16:creationId xmlns:a16="http://schemas.microsoft.com/office/drawing/2014/main" id="{9009C9E1-2EC0-D557-3D03-0A9BEC51B5ED}"/>
+              </a:ext>
+            </a:extLst>
+          </p:cNvPr>
+          <p:cNvSpPr>
+            <a:spLocks noGrp="1"/>
+          </p:cNvSpPr>
+          <p:nvPr>
+            <p:ph type="title"/>
+          </p:nvPr>
+        </p:nvSpPr>
+        <p:spPr/>
+        <p:txBody>
+          <a:bodyPr/>
+          <a:lstStyle/>
+          <a:p>
+            <a:r>
+              <a:rPr lang="en-US" dirty="0"/>
+              <a:t>Model Building (01 – Tag likelihoods)</a:t>
+            </a:r>
+          </a:p>
+        </p:txBody>
+      </p:sp>
+      <p:pic>
+        <p:nvPicPr>
+          <p:cNvPr id="6" name="Picture 5">
+            <a:extLst>
+              <a:ext uri="{FF2B5EF4-FFF2-40B4-BE49-F238E27FC236}">
+                <a16:creationId xmlns:a16="http://schemas.microsoft.com/office/drawing/2014/main" id="{487BA5F3-AA18-17AA-E52D-4BC05B38B37E}"/>
+              </a:ext>
+            </a:extLst>
+          </p:cNvPr>
+          <p:cNvPicPr>
+            <a:picLocks noChangeAspect="1"/>
+          </p:cNvPicPr>
+          <p:nvPr/>
+        </p:nvPicPr>
+        <p:blipFill>
+          <a:blip r:embed="rId2"/>
+          <a:stretch>
+            <a:fillRect/>
+          </a:stretch>
+        </p:blipFill>
+        <p:spPr>
+          <a:xfrm>
+            <a:off x="377686" y="1379329"/>
+            <a:ext cx="11740009" cy="5478671"/>
+          </a:xfrm>
+          <a:prstGeom prst="rect">
+            <a:avLst/>
+          </a:prstGeom>
+        </p:spPr>
+      </p:pic>
+    </p:spTree>
+    <p:extLst>
+      <p:ext uri="{BB962C8B-B14F-4D97-AF65-F5344CB8AC3E}">
+        <p14:creationId xmlns:p14="http://schemas.microsoft.com/office/powerpoint/2010/main" val="533865750"/>
+      </p:ext>
+    </p:extLst>
+  </p:cSld>
+  <p:clrMapOvr>
+    <a:masterClrMapping/>
+  </p:clrMapOvr>
+</p:sld>
+</file>
+
+<file path=ppt/slides/slide8.xml><?xml version="1.0" encoding="utf-8"?>
+<p:sld xmlns:a="http://schemas.openxmlformats.org/drawingml/2006/main" xmlns:r="http://schemas.openxmlformats.org/officeDocument/2006/relationships" xmlns:p="http://schemas.openxmlformats.org/presentationml/2006/main">
+  <p:cSld>
+    <p:spTree>
+      <p:nvGrpSpPr>
+        <p:cNvPr id="1" name="">
+          <a:extLst>
+            <a:ext uri="{FF2B5EF4-FFF2-40B4-BE49-F238E27FC236}">
+              <a16:creationId xmlns:a16="http://schemas.microsoft.com/office/drawing/2014/main" id="{36C4DC24-F900-AAB2-36A9-E8C2DB9621D9}"/>
+            </a:ext>
+          </a:extLst>
+        </p:cNvPr>
+        <p:cNvGrpSpPr/>
+        <p:nvPr/>
+      </p:nvGrpSpPr>
+      <p:grpSpPr>
+        <a:xfrm>
+          <a:off x="0" y="0"/>
+          <a:ext cx="0" cy="0"/>
+          <a:chOff x="0" y="0"/>
+          <a:chExt cx="0" cy="0"/>
+        </a:xfrm>
+      </p:grpSpPr>
+      <p:sp>
+        <p:nvSpPr>
+          <p:cNvPr id="2" name="Title 1">
+            <a:extLst>
+              <a:ext uri="{FF2B5EF4-FFF2-40B4-BE49-F238E27FC236}">
+                <a16:creationId xmlns:a16="http://schemas.microsoft.com/office/drawing/2014/main" id="{BE3332F4-14E8-1821-129B-5AD270C7E89D}"/>
+              </a:ext>
+            </a:extLst>
+          </p:cNvPr>
+          <p:cNvSpPr>
+            <a:spLocks noGrp="1"/>
+          </p:cNvSpPr>
+          <p:nvPr>
+            <p:ph type="title"/>
+          </p:nvPr>
+        </p:nvSpPr>
+        <p:spPr/>
+        <p:txBody>
+          <a:bodyPr/>
+          <a:lstStyle/>
+          <a:p>
+            <a:r>
+              <a:rPr lang="en-US" dirty="0"/>
+              <a:t>Model Building (01 – Tag likelihoods)</a:t>
+            </a:r>
+          </a:p>
+        </p:txBody>
+      </p:sp>
+      <p:pic>
+        <p:nvPicPr>
+          <p:cNvPr id="5" name="Picture 4">
+            <a:extLst>
+              <a:ext uri="{FF2B5EF4-FFF2-40B4-BE49-F238E27FC236}">
+                <a16:creationId xmlns:a16="http://schemas.microsoft.com/office/drawing/2014/main" id="{E11B181F-C890-3B23-7881-5369DF8572E0}"/>
+              </a:ext>
+            </a:extLst>
+          </p:cNvPr>
+          <p:cNvPicPr>
+            <a:picLocks noChangeAspect="1"/>
+          </p:cNvPicPr>
+          <p:nvPr/>
+        </p:nvPicPr>
+        <p:blipFill>
+          <a:blip r:embed="rId2"/>
+          <a:stretch>
+            <a:fillRect/>
+          </a:stretch>
+        </p:blipFill>
+        <p:spPr>
+          <a:xfrm>
+            <a:off x="698739" y="1489973"/>
+            <a:ext cx="11299577" cy="5273136"/>
+          </a:xfrm>
+          <a:prstGeom prst="rect">
+            <a:avLst/>
+          </a:prstGeom>
+        </p:spPr>
+      </p:pic>
+    </p:spTree>
+    <p:extLst>
+      <p:ext uri="{BB962C8B-B14F-4D97-AF65-F5344CB8AC3E}">
+        <p14:creationId xmlns:p14="http://schemas.microsoft.com/office/powerpoint/2010/main" val="375089909"/>
+      </p:ext>
+    </p:extLst>
+  </p:cSld>
+  <p:clrMapOvr>
+    <a:masterClrMapping/>
+  </p:clrMapOvr>
+</p:sld>
+</file>
+
+<file path=ppt/slides/slide9.xml><?xml version="1.0" encoding="utf-8"?>
 <p:sld xmlns:a="http://schemas.openxmlformats.org/drawingml/2006/main" xmlns:r="http://schemas.openxmlformats.org/officeDocument/2006/relationships" xmlns:p="http://schemas.openxmlformats.org/presentationml/2006/main">
   <p:cSld>
     <p:spTree>
@@ -4127,7 +7157,7 @@
           <p:cNvPr id="2" name="Title 1">
             <a:extLst>
               <a:ext uri="{FF2B5EF4-FFF2-40B4-BE49-F238E27FC236}">
-                <a16:creationId xmlns:a16="http://schemas.microsoft.com/office/drawing/2014/main" id="{56F0C79C-B8A2-A003-733C-2665456EAA11}"/>
+                <a16:creationId xmlns:a16="http://schemas.microsoft.com/office/drawing/2014/main" id="{35C4A60D-39FF-A887-5CE6-89E6E28BFA43}"/>
               </a:ext>
             </a:extLst>
           </p:cNvPr>
@@ -4145,7 +7175,7 @@
           <a:p>
             <a:r>
               <a:rPr lang="en-US" dirty="0"/>
-              <a:t>Catchability</a:t>
+              <a:t>Model Building (01 – Tag likelihoods)</a:t>
             </a:r>
           </a:p>
         </p:txBody>
@@ -4155,7 +7185,7 @@
           <p:cNvPr id="3" name="Content Placeholder 2">
             <a:extLst>
               <a:ext uri="{FF2B5EF4-FFF2-40B4-BE49-F238E27FC236}">
-                <a16:creationId xmlns:a16="http://schemas.microsoft.com/office/drawing/2014/main" id="{1413F9A3-70DC-A2DE-F52B-CA903EB5DBFC}"/>
+                <a16:creationId xmlns:a16="http://schemas.microsoft.com/office/drawing/2014/main" id="{F62EB777-0505-15C7-5005-03BE94C0EC8E}"/>
               </a:ext>
             </a:extLst>
           </p:cNvPr>
@@ -4172,8 +7202,38 @@
           <a:lstStyle/>
           <a:p>
             <a:r>
-              <a:rPr lang="en-US" dirty="0"/>
-              <a:t>Compare spatially varying vs. spatially invariant</a:t>
+              <a:rPr lang="en-US" dirty="0" err="1"/>
+              <a:t>NegBin</a:t>
+            </a:r>
+            <a:r>
+              <a:rPr lang="en-US" dirty="0"/>
+              <a:t> fits index better, at the cost of fitting tag recaptures (which makes sense given that </a:t>
+            </a:r>
+            <a:r>
+              <a:rPr lang="en-US" dirty="0" err="1"/>
+              <a:t>NegBin</a:t>
+            </a:r>
+            <a:r>
+              <a:rPr lang="en-US" dirty="0"/>
+              <a:t> allows for overdispersion)</a:t>
+            </a:r>
+          </a:p>
+          <a:p>
+            <a:r>
+              <a:rPr lang="en-US" dirty="0"/>
+              <a:t>Tag recaptures are likely? to exhibit overdispersion so my inclination is to go with this parameterization.</a:t>
+            </a:r>
+          </a:p>
+          <a:p>
+            <a:r>
+              <a:rPr lang="en-US" dirty="0"/>
+              <a:t>Also, following the idea of Francis (2011) that we should prioritize fits to index data</a:t>
+            </a:r>
+          </a:p>
+          <a:p>
+            <a:r>
+              <a:rPr lang="en-US" dirty="0"/>
+              <a:t>Fits to all comp data are pretty similar so not showing here. </a:t>
             </a:r>
           </a:p>
         </p:txBody>
@@ -4181,7 +7241,7 @@
     </p:spTree>
     <p:extLst>
       <p:ext uri="{BB962C8B-B14F-4D97-AF65-F5344CB8AC3E}">
-        <p14:creationId xmlns:p14="http://schemas.microsoft.com/office/powerpoint/2010/main" val="4181981952"/>
+        <p14:creationId xmlns:p14="http://schemas.microsoft.com/office/powerpoint/2010/main" val="3292520393"/>
       </p:ext>
     </p:extLst>
   </p:cSld>

</xml_diff>